<commit_message>
added a quick demo file
</commit_message>
<xml_diff>
--- a/2020.05.21/The Art of the ReprEx.pptx
+++ b/2020.05.21/The Art of the ReprEx.pptx
@@ -5,7 +5,7 @@
     <p:sldMasterId id="2147483648" r:id="rId4"/>
   </p:sldMasterIdLst>
   <p:notesMasterIdLst>
-    <p:notesMasterId r:id="rId16"/>
+    <p:notesMasterId r:id="rId17"/>
   </p:notesMasterIdLst>
   <p:sldIdLst>
     <p:sldId id="256" r:id="rId5"/>
@@ -15,10 +15,11 @@
     <p:sldId id="260" r:id="rId9"/>
     <p:sldId id="262" r:id="rId10"/>
     <p:sldId id="268" r:id="rId11"/>
-    <p:sldId id="264" r:id="rId12"/>
-    <p:sldId id="266" r:id="rId13"/>
-    <p:sldId id="267" r:id="rId14"/>
-    <p:sldId id="263" r:id="rId15"/>
+    <p:sldId id="269" r:id="rId12"/>
+    <p:sldId id="264" r:id="rId13"/>
+    <p:sldId id="266" r:id="rId14"/>
+    <p:sldId id="267" r:id="rId15"/>
+    <p:sldId id="263" r:id="rId16"/>
   </p:sldIdLst>
   <p:sldSz cx="12192000" cy="6858000"/>
   <p:notesSz cx="6858000" cy="9144000"/>
@@ -117,7 +118,174 @@
       </a:defRPr>
     </a:lvl9pPr>
   </p:defaultTextStyle>
+  <p:extLst>
+    <p:ext uri="{EFAFB233-063F-42B5-8137-9DF3F51BA10A}">
+      <p15:sldGuideLst xmlns:p15="http://schemas.microsoft.com/office/powerpoint/2012/main"/>
+    </p:ext>
+  </p:extLst>
 </p:presentation>
+</file>
+
+<file path=ppt/revisionInfo.xml><?xml version="1.0" encoding="utf-8"?>
+<p1510:revInfo xmlns:a="http://schemas.openxmlformats.org/drawingml/2006/main" xmlns:r="http://schemas.openxmlformats.org/officeDocument/2006/relationships" xmlns:p1510="http://schemas.microsoft.com/office/powerpoint/2015/10/main">
+  <p1510:revLst>
+    <p1510:client id="{A33F2DE7-3CF0-4029-AA46-D310800AD764}" v="28" dt="2020-05-21T20:12:34.468"/>
+  </p1510:revLst>
+</p1510:revInfo>
+</file>
+
+<file path=ppt/changesInfos/changesInfo1.xml><?xml version="1.0" encoding="utf-8"?>
+<pc:chgInfo xmlns:a="http://schemas.openxmlformats.org/drawingml/2006/main" xmlns:r="http://schemas.openxmlformats.org/officeDocument/2006/relationships" xmlns:ac="http://schemas.microsoft.com/office/drawing/2013/main/command" xmlns:pc="http://schemas.microsoft.com/office/powerpoint/2013/main/command">
+  <pc:docChgLst>
+    <pc:chgData name="Hartman, Rosemary@DWR" userId="984f44d5-4180-46ad-9b77-e367b17d9727" providerId="ADAL" clId="{A33F2DE7-3CF0-4029-AA46-D310800AD764}"/>
+    <pc:docChg chg="custSel addSld modSld">
+      <pc:chgData name="Hartman, Rosemary@DWR" userId="984f44d5-4180-46ad-9b77-e367b17d9727" providerId="ADAL" clId="{A33F2DE7-3CF0-4029-AA46-D310800AD764}" dt="2020-05-21T20:13:15.664" v="471" actId="20577"/>
+      <pc:docMkLst>
+        <pc:docMk/>
+      </pc:docMkLst>
+      <pc:sldChg chg="modSp mod">
+        <pc:chgData name="Hartman, Rosemary@DWR" userId="984f44d5-4180-46ad-9b77-e367b17d9727" providerId="ADAL" clId="{A33F2DE7-3CF0-4029-AA46-D310800AD764}" dt="2020-05-21T19:42:57.551" v="0" actId="313"/>
+        <pc:sldMkLst>
+          <pc:docMk/>
+          <pc:sldMk cId="3874532533" sldId="256"/>
+        </pc:sldMkLst>
+        <pc:spChg chg="mod">
+          <ac:chgData name="Hartman, Rosemary@DWR" userId="984f44d5-4180-46ad-9b77-e367b17d9727" providerId="ADAL" clId="{A33F2DE7-3CF0-4029-AA46-D310800AD764}" dt="2020-05-21T19:42:57.551" v="0" actId="313"/>
+          <ac:spMkLst>
+            <pc:docMk/>
+            <pc:sldMk cId="3874532533" sldId="256"/>
+            <ac:spMk id="3" creationId="{5DC4FC7A-793F-4E64-AAEC-D3174DCAA6A9}"/>
+          </ac:spMkLst>
+        </pc:spChg>
+      </pc:sldChg>
+      <pc:sldChg chg="modSp mod">
+        <pc:chgData name="Hartman, Rosemary@DWR" userId="984f44d5-4180-46ad-9b77-e367b17d9727" providerId="ADAL" clId="{A33F2DE7-3CF0-4029-AA46-D310800AD764}" dt="2020-05-21T20:13:15.664" v="471" actId="20577"/>
+        <pc:sldMkLst>
+          <pc:docMk/>
+          <pc:sldMk cId="192192724" sldId="267"/>
+        </pc:sldMkLst>
+        <pc:spChg chg="mod">
+          <ac:chgData name="Hartman, Rosemary@DWR" userId="984f44d5-4180-46ad-9b77-e367b17d9727" providerId="ADAL" clId="{A33F2DE7-3CF0-4029-AA46-D310800AD764}" dt="2020-05-21T20:13:15.664" v="471" actId="20577"/>
+          <ac:spMkLst>
+            <pc:docMk/>
+            <pc:sldMk cId="192192724" sldId="267"/>
+            <ac:spMk id="3" creationId="{4787BA01-4964-46B4-B1B6-7F8B424EB919}"/>
+          </ac:spMkLst>
+        </pc:spChg>
+        <pc:picChg chg="mod">
+          <ac:chgData name="Hartman, Rosemary@DWR" userId="984f44d5-4180-46ad-9b77-e367b17d9727" providerId="ADAL" clId="{A33F2DE7-3CF0-4029-AA46-D310800AD764}" dt="2020-05-21T20:12:34.468" v="361" actId="1076"/>
+          <ac:picMkLst>
+            <pc:docMk/>
+            <pc:sldMk cId="192192724" sldId="267"/>
+            <ac:picMk id="8194" creationId="{63703C80-1E1F-466A-B5C4-0DD89B0D2953}"/>
+          </ac:picMkLst>
+        </pc:picChg>
+      </pc:sldChg>
+      <pc:sldChg chg="addSp delSp modSp mod">
+        <pc:chgData name="Hartman, Rosemary@DWR" userId="984f44d5-4180-46ad-9b77-e367b17d9727" providerId="ADAL" clId="{A33F2DE7-3CF0-4029-AA46-D310800AD764}" dt="2020-05-21T19:57:35.855" v="303" actId="21"/>
+        <pc:sldMkLst>
+          <pc:docMk/>
+          <pc:sldMk cId="1773351247" sldId="268"/>
+        </pc:sldMkLst>
+        <pc:spChg chg="mod">
+          <ac:chgData name="Hartman, Rosemary@DWR" userId="984f44d5-4180-46ad-9b77-e367b17d9727" providerId="ADAL" clId="{A33F2DE7-3CF0-4029-AA46-D310800AD764}" dt="2020-05-21T19:49:40.358" v="52" actId="1076"/>
+          <ac:spMkLst>
+            <pc:docMk/>
+            <pc:sldMk cId="1773351247" sldId="268"/>
+            <ac:spMk id="3" creationId="{4787BA01-4964-46B4-B1B6-7F8B424EB919}"/>
+          </ac:spMkLst>
+        </pc:spChg>
+        <pc:spChg chg="mod">
+          <ac:chgData name="Hartman, Rosemary@DWR" userId="984f44d5-4180-46ad-9b77-e367b17d9727" providerId="ADAL" clId="{A33F2DE7-3CF0-4029-AA46-D310800AD764}" dt="2020-05-21T19:49:43.440" v="54" actId="1076"/>
+          <ac:spMkLst>
+            <pc:docMk/>
+            <pc:sldMk cId="1773351247" sldId="268"/>
+            <ac:spMk id="8" creationId="{C2B9536B-88C1-497F-97BF-780F849F1A79}"/>
+          </ac:spMkLst>
+        </pc:spChg>
+        <pc:spChg chg="add del mod">
+          <ac:chgData name="Hartman, Rosemary@DWR" userId="984f44d5-4180-46ad-9b77-e367b17d9727" providerId="ADAL" clId="{A33F2DE7-3CF0-4029-AA46-D310800AD764}" dt="2020-05-21T19:57:35.855" v="303" actId="21"/>
+          <ac:spMkLst>
+            <pc:docMk/>
+            <pc:sldMk cId="1773351247" sldId="268"/>
+            <ac:spMk id="9" creationId="{D9EEC81D-F5D0-4ECF-B71E-AF29F77C585E}"/>
+          </ac:spMkLst>
+        </pc:spChg>
+        <pc:spChg chg="add del mod">
+          <ac:chgData name="Hartman, Rosemary@DWR" userId="984f44d5-4180-46ad-9b77-e367b17d9727" providerId="ADAL" clId="{A33F2DE7-3CF0-4029-AA46-D310800AD764}" dt="2020-05-21T19:49:18.993" v="47" actId="478"/>
+          <ac:spMkLst>
+            <pc:docMk/>
+            <pc:sldMk cId="1773351247" sldId="268"/>
+            <ac:spMk id="10" creationId="{1B727F3C-1C01-479D-A418-5D6EDAA0AB2C}"/>
+          </ac:spMkLst>
+        </pc:spChg>
+        <pc:picChg chg="mod">
+          <ac:chgData name="Hartman, Rosemary@DWR" userId="984f44d5-4180-46ad-9b77-e367b17d9727" providerId="ADAL" clId="{A33F2DE7-3CF0-4029-AA46-D310800AD764}" dt="2020-05-21T19:49:41.758" v="53" actId="1076"/>
+          <ac:picMkLst>
+            <pc:docMk/>
+            <pc:sldMk cId="1773351247" sldId="268"/>
+            <ac:picMk id="6" creationId="{D838AA90-5C94-4A66-A6E3-FFC6C3F7BC8E}"/>
+          </ac:picMkLst>
+        </pc:picChg>
+        <pc:picChg chg="mod">
+          <ac:chgData name="Hartman, Rosemary@DWR" userId="984f44d5-4180-46ad-9b77-e367b17d9727" providerId="ADAL" clId="{A33F2DE7-3CF0-4029-AA46-D310800AD764}" dt="2020-05-21T19:49:48.188" v="56" actId="1076"/>
+          <ac:picMkLst>
+            <pc:docMk/>
+            <pc:sldMk cId="1773351247" sldId="268"/>
+            <ac:picMk id="7" creationId="{A460936E-F6A9-4E22-A61D-298F62294A15}"/>
+          </ac:picMkLst>
+        </pc:picChg>
+        <pc:picChg chg="mod">
+          <ac:chgData name="Hartman, Rosemary@DWR" userId="984f44d5-4180-46ad-9b77-e367b17d9727" providerId="ADAL" clId="{A33F2DE7-3CF0-4029-AA46-D310800AD764}" dt="2020-05-21T19:49:49.690" v="57" actId="1076"/>
+          <ac:picMkLst>
+            <pc:docMk/>
+            <pc:sldMk cId="1773351247" sldId="268"/>
+            <ac:picMk id="6146" creationId="{BBFDF2F0-F6E8-4417-A11E-BEE49AA3E156}"/>
+          </ac:picMkLst>
+        </pc:picChg>
+      </pc:sldChg>
+      <pc:sldChg chg="addSp modSp new mod">
+        <pc:chgData name="Hartman, Rosemary@DWR" userId="984f44d5-4180-46ad-9b77-e367b17d9727" providerId="ADAL" clId="{A33F2DE7-3CF0-4029-AA46-D310800AD764}" dt="2020-05-21T20:12:23.252" v="360" actId="1076"/>
+        <pc:sldMkLst>
+          <pc:docMk/>
+          <pc:sldMk cId="2725107383" sldId="269"/>
+        </pc:sldMkLst>
+        <pc:spChg chg="mod">
+          <ac:chgData name="Hartman, Rosemary@DWR" userId="984f44d5-4180-46ad-9b77-e367b17d9727" providerId="ADAL" clId="{A33F2DE7-3CF0-4029-AA46-D310800AD764}" dt="2020-05-21T19:57:27.752" v="301" actId="20577"/>
+          <ac:spMkLst>
+            <pc:docMk/>
+            <pc:sldMk cId="2725107383" sldId="269"/>
+            <ac:spMk id="2" creationId="{6EE51112-8C0C-4526-99C9-8F304F973394}"/>
+          </ac:spMkLst>
+        </pc:spChg>
+        <pc:spChg chg="mod">
+          <ac:chgData name="Hartman, Rosemary@DWR" userId="984f44d5-4180-46ad-9b77-e367b17d9727" providerId="ADAL" clId="{A33F2DE7-3CF0-4029-AA46-D310800AD764}" dt="2020-05-21T19:58:01.619" v="356" actId="20577"/>
+          <ac:spMkLst>
+            <pc:docMk/>
+            <pc:sldMk cId="2725107383" sldId="269"/>
+            <ac:spMk id="3" creationId="{979CB9C5-9B2C-4894-801B-83B3ED8DD5D3}"/>
+          </ac:spMkLst>
+        </pc:spChg>
+        <pc:spChg chg="add mod">
+          <ac:chgData name="Hartman, Rosemary@DWR" userId="984f44d5-4180-46ad-9b77-e367b17d9727" providerId="ADAL" clId="{A33F2DE7-3CF0-4029-AA46-D310800AD764}" dt="2020-05-21T19:57:49.083" v="307" actId="1076"/>
+          <ac:spMkLst>
+            <pc:docMk/>
+            <pc:sldMk cId="2725107383" sldId="269"/>
+            <ac:spMk id="4" creationId="{DB49A79D-516F-4E5A-8F43-355E07BE4D4F}"/>
+          </ac:spMkLst>
+        </pc:spChg>
+        <pc:picChg chg="add mod">
+          <ac:chgData name="Hartman, Rosemary@DWR" userId="984f44d5-4180-46ad-9b77-e367b17d9727" providerId="ADAL" clId="{A33F2DE7-3CF0-4029-AA46-D310800AD764}" dt="2020-05-21T20:12:23.252" v="360" actId="1076"/>
+          <ac:picMkLst>
+            <pc:docMk/>
+            <pc:sldMk cId="2725107383" sldId="269"/>
+            <ac:picMk id="1026" creationId="{75CA32DC-3020-4048-8483-B1B2CB6581BE}"/>
+          </ac:picMkLst>
+        </pc:picChg>
+      </pc:sldChg>
+    </pc:docChg>
+  </pc:docChgLst>
+</pc:chgInfo>
 </file>
 
 <file path=ppt/notesMasters/notesMaster1.xml><?xml version="1.0" encoding="utf-8"?>
@@ -202,7 +370,7 @@
           <a:p>
             <a:fld id="{6BAB76B9-92A0-4E7D-92F5-6C741A11D630}" type="datetimeFigureOut">
               <a:rPr lang="en-US" smtClean="0"/>
-              <a:t>5/13/2020</a:t>
+              <a:t>5/21/2020</a:t>
             </a:fld>
             <a:endParaRPr lang="en-US"/>
           </a:p>
@@ -1155,7 +1323,7 @@
           <a:p>
             <a:fld id="{2732B262-FA07-4F20-A902-EC362A0D731D}" type="datetimeFigureOut">
               <a:rPr lang="en-US" smtClean="0"/>
-              <a:t>5/13/2020</a:t>
+              <a:t>5/21/2020</a:t>
             </a:fld>
             <a:endParaRPr lang="en-US"/>
           </a:p>
@@ -1353,7 +1521,7 @@
           <a:p>
             <a:fld id="{2732B262-FA07-4F20-A902-EC362A0D731D}" type="datetimeFigureOut">
               <a:rPr lang="en-US" smtClean="0"/>
-              <a:t>5/13/2020</a:t>
+              <a:t>5/21/2020</a:t>
             </a:fld>
             <a:endParaRPr lang="en-US"/>
           </a:p>
@@ -1561,7 +1729,7 @@
           <a:p>
             <a:fld id="{2732B262-FA07-4F20-A902-EC362A0D731D}" type="datetimeFigureOut">
               <a:rPr lang="en-US" smtClean="0"/>
-              <a:t>5/13/2020</a:t>
+              <a:t>5/21/2020</a:t>
             </a:fld>
             <a:endParaRPr lang="en-US"/>
           </a:p>
@@ -1759,7 +1927,7 @@
           <a:p>
             <a:fld id="{2732B262-FA07-4F20-A902-EC362A0D731D}" type="datetimeFigureOut">
               <a:rPr lang="en-US" smtClean="0"/>
-              <a:t>5/13/2020</a:t>
+              <a:t>5/21/2020</a:t>
             </a:fld>
             <a:endParaRPr lang="en-US"/>
           </a:p>
@@ -2034,7 +2202,7 @@
           <a:p>
             <a:fld id="{2732B262-FA07-4F20-A902-EC362A0D731D}" type="datetimeFigureOut">
               <a:rPr lang="en-US" smtClean="0"/>
-              <a:t>5/13/2020</a:t>
+              <a:t>5/21/2020</a:t>
             </a:fld>
             <a:endParaRPr lang="en-US"/>
           </a:p>
@@ -2299,7 +2467,7 @@
           <a:p>
             <a:fld id="{2732B262-FA07-4F20-A902-EC362A0D731D}" type="datetimeFigureOut">
               <a:rPr lang="en-US" smtClean="0"/>
-              <a:t>5/13/2020</a:t>
+              <a:t>5/21/2020</a:t>
             </a:fld>
             <a:endParaRPr lang="en-US"/>
           </a:p>
@@ -2711,7 +2879,7 @@
           <a:p>
             <a:fld id="{2732B262-FA07-4F20-A902-EC362A0D731D}" type="datetimeFigureOut">
               <a:rPr lang="en-US" smtClean="0"/>
-              <a:t>5/13/2020</a:t>
+              <a:t>5/21/2020</a:t>
             </a:fld>
             <a:endParaRPr lang="en-US"/>
           </a:p>
@@ -2852,7 +3020,7 @@
           <a:p>
             <a:fld id="{2732B262-FA07-4F20-A902-EC362A0D731D}" type="datetimeFigureOut">
               <a:rPr lang="en-US" smtClean="0"/>
-              <a:t>5/13/2020</a:t>
+              <a:t>5/21/2020</a:t>
             </a:fld>
             <a:endParaRPr lang="en-US"/>
           </a:p>
@@ -2965,7 +3133,7 @@
           <a:p>
             <a:fld id="{2732B262-FA07-4F20-A902-EC362A0D731D}" type="datetimeFigureOut">
               <a:rPr lang="en-US" smtClean="0"/>
-              <a:t>5/13/2020</a:t>
+              <a:t>5/21/2020</a:t>
             </a:fld>
             <a:endParaRPr lang="en-US"/>
           </a:p>
@@ -3276,7 +3444,7 @@
           <a:p>
             <a:fld id="{2732B262-FA07-4F20-A902-EC362A0D731D}" type="datetimeFigureOut">
               <a:rPr lang="en-US" smtClean="0"/>
-              <a:t>5/13/2020</a:t>
+              <a:t>5/21/2020</a:t>
             </a:fld>
             <a:endParaRPr lang="en-US"/>
           </a:p>
@@ -3564,7 +3732,7 @@
           <a:p>
             <a:fld id="{2732B262-FA07-4F20-A902-EC362A0D731D}" type="datetimeFigureOut">
               <a:rPr lang="en-US" smtClean="0"/>
-              <a:t>5/13/2020</a:t>
+              <a:t>5/21/2020</a:t>
             </a:fld>
             <a:endParaRPr lang="en-US"/>
           </a:p>
@@ -3805,7 +3973,7 @@
           <a:p>
             <a:fld id="{2732B262-FA07-4F20-A902-EC362A0D731D}" type="datetimeFigureOut">
               <a:rPr lang="en-US" smtClean="0"/>
-              <a:t>5/13/2020</a:t>
+              <a:t>5/21/2020</a:t>
             </a:fld>
             <a:endParaRPr lang="en-US"/>
           </a:p>
@@ -4278,15 +4446,7 @@
           <a:p>
             <a:r>
               <a:rPr lang="en-US" dirty="0"/>
-              <a:t>(</a:t>
-            </a:r>
-            <a:r>
-              <a:rPr lang="en-US" dirty="0" err="1"/>
-              <a:t>Reproducable</a:t>
-            </a:r>
-            <a:r>
-              <a:rPr lang="en-US" dirty="0"/>
-              <a:t> Example)</a:t>
+              <a:t>(Reproducible Example)</a:t>
             </a:r>
           </a:p>
           <a:p>
@@ -4317,1562 +4477,6 @@
 </file>
 
 <file path=ppt/slides/slide10.xml><?xml version="1.0" encoding="utf-8"?>
-<p:sld xmlns:a="http://schemas.openxmlformats.org/drawingml/2006/main" xmlns:r="http://schemas.openxmlformats.org/officeDocument/2006/relationships" xmlns:p="http://schemas.openxmlformats.org/presentationml/2006/main">
-  <p:cSld>
-    <p:spTree>
-      <p:nvGrpSpPr>
-        <p:cNvPr id="1" name=""/>
-        <p:cNvGrpSpPr/>
-        <p:nvPr/>
-      </p:nvGrpSpPr>
-      <p:grpSpPr>
-        <a:xfrm>
-          <a:off x="0" y="0"/>
-          <a:ext cx="0" cy="0"/>
-          <a:chOff x="0" y="0"/>
-          <a:chExt cx="0" cy="0"/>
-        </a:xfrm>
-      </p:grpSpPr>
-      <p:sp>
-        <p:nvSpPr>
-          <p:cNvPr id="2" name="Title 1">
-            <a:extLst>
-              <a:ext uri="{FF2B5EF4-FFF2-40B4-BE49-F238E27FC236}">
-                <a16:creationId xmlns:a16="http://schemas.microsoft.com/office/drawing/2014/main" id="{9E841C5C-1691-4109-881B-34B7C859C7B4}"/>
-              </a:ext>
-            </a:extLst>
-          </p:cNvPr>
-          <p:cNvSpPr>
-            <a:spLocks noGrp="1"/>
-          </p:cNvSpPr>
-          <p:nvPr>
-            <p:ph type="title"/>
-          </p:nvPr>
-        </p:nvSpPr>
-        <p:spPr/>
-        <p:txBody>
-          <a:bodyPr/>
-          <a:lstStyle/>
-          <a:p>
-            <a:r>
-              <a:rPr lang="en-US" dirty="0"/>
-              <a:t>Step 4: Test it out.</a:t>
-            </a:r>
-          </a:p>
-        </p:txBody>
-      </p:sp>
-      <p:sp>
-        <p:nvSpPr>
-          <p:cNvPr id="3" name="Content Placeholder 2">
-            <a:extLst>
-              <a:ext uri="{FF2B5EF4-FFF2-40B4-BE49-F238E27FC236}">
-                <a16:creationId xmlns:a16="http://schemas.microsoft.com/office/drawing/2014/main" id="{4787BA01-4964-46B4-B1B6-7F8B424EB919}"/>
-              </a:ext>
-            </a:extLst>
-          </p:cNvPr>
-          <p:cNvSpPr>
-            <a:spLocks noGrp="1"/>
-          </p:cNvSpPr>
-          <p:nvPr>
-            <p:ph idx="1"/>
-          </p:nvPr>
-        </p:nvSpPr>
-        <p:spPr>
-          <a:xfrm>
-            <a:off x="838200" y="1690688"/>
-            <a:ext cx="10515600" cy="4351338"/>
-          </a:xfrm>
-        </p:spPr>
-        <p:txBody>
-          <a:bodyPr/>
-          <a:lstStyle/>
-          <a:p>
-            <a:r>
-              <a:rPr lang="en-US" dirty="0"/>
-              <a:t>Make sure it runs when your environment has been cleared. Double-check that you have loaded any required packages.</a:t>
-            </a:r>
-          </a:p>
-        </p:txBody>
-      </p:sp>
-      <p:pic>
-        <p:nvPicPr>
-          <p:cNvPr id="8194" name="Picture 2" descr="bane kitty demands you test your code! - bane cat | Meme Generator">
-            <a:extLst>
-              <a:ext uri="{FF2B5EF4-FFF2-40B4-BE49-F238E27FC236}">
-                <a16:creationId xmlns:a16="http://schemas.microsoft.com/office/drawing/2014/main" id="{63703C80-1E1F-466A-B5C4-0DD89B0D2953}"/>
-              </a:ext>
-            </a:extLst>
-          </p:cNvPr>
-          <p:cNvPicPr>
-            <a:picLocks noChangeAspect="1" noChangeArrowheads="1"/>
-          </p:cNvPicPr>
-          <p:nvPr/>
-        </p:nvPicPr>
-        <p:blipFill>
-          <a:blip r:embed="rId2">
-            <a:extLst>
-              <a:ext uri="{28A0092B-C50C-407E-A947-70E740481C1C}">
-                <a14:useLocalDpi xmlns:a14="http://schemas.microsoft.com/office/drawing/2010/main" val="0"/>
-              </a:ext>
-            </a:extLst>
-          </a:blip>
-          <a:srcRect/>
-          <a:stretch>
-            <a:fillRect/>
-          </a:stretch>
-        </p:blipFill>
-        <p:spPr bwMode="auto">
-          <a:xfrm>
-            <a:off x="4253107" y="3107662"/>
-            <a:ext cx="3888904" cy="2341416"/>
-          </a:xfrm>
-          <a:prstGeom prst="rect">
-            <a:avLst/>
-          </a:prstGeom>
-          <a:noFill/>
-          <a:extLst>
-            <a:ext uri="{909E8E84-426E-40DD-AFC4-6F175D3DCCD1}">
-              <a14:hiddenFill xmlns:a14="http://schemas.microsoft.com/office/drawing/2010/main">
-                <a:solidFill>
-                  <a:srgbClr val="FFFFFF"/>
-                </a:solidFill>
-              </a14:hiddenFill>
-            </a:ext>
-          </a:extLst>
-        </p:spPr>
-      </p:pic>
-    </p:spTree>
-    <p:extLst>
-      <p:ext uri="{BB962C8B-B14F-4D97-AF65-F5344CB8AC3E}">
-        <p14:creationId xmlns:p14="http://schemas.microsoft.com/office/powerpoint/2010/main" val="192192724"/>
-      </p:ext>
-    </p:extLst>
-  </p:cSld>
-  <p:clrMapOvr>
-    <a:masterClrMapping/>
-  </p:clrMapOvr>
-</p:sld>
-</file>
-
-<file path=ppt/slides/slide11.xml><?xml version="1.0" encoding="utf-8"?>
-<p:sld xmlns:a="http://schemas.openxmlformats.org/drawingml/2006/main" xmlns:r="http://schemas.openxmlformats.org/officeDocument/2006/relationships" xmlns:p="http://schemas.openxmlformats.org/presentationml/2006/main">
-  <p:cSld>
-    <p:spTree>
-      <p:nvGrpSpPr>
-        <p:cNvPr id="1" name=""/>
-        <p:cNvGrpSpPr/>
-        <p:nvPr/>
-      </p:nvGrpSpPr>
-      <p:grpSpPr>
-        <a:xfrm>
-          <a:off x="0" y="0"/>
-          <a:ext cx="0" cy="0"/>
-          <a:chOff x="0" y="0"/>
-          <a:chExt cx="0" cy="0"/>
-        </a:xfrm>
-      </p:grpSpPr>
-      <p:sp>
-        <p:nvSpPr>
-          <p:cNvPr id="2" name="Title 1">
-            <a:extLst>
-              <a:ext uri="{FF2B5EF4-FFF2-40B4-BE49-F238E27FC236}">
-                <a16:creationId xmlns:a16="http://schemas.microsoft.com/office/drawing/2014/main" id="{CB97F58F-732E-4304-BBB2-1A9841AFF58A}"/>
-              </a:ext>
-            </a:extLst>
-          </p:cNvPr>
-          <p:cNvSpPr>
-            <a:spLocks noGrp="1"/>
-          </p:cNvSpPr>
-          <p:nvPr>
-            <p:ph type="title"/>
-          </p:nvPr>
-        </p:nvSpPr>
-        <p:spPr/>
-        <p:txBody>
-          <a:bodyPr/>
-          <a:lstStyle/>
-          <a:p>
-            <a:r>
-              <a:rPr lang="en-US" dirty="0"/>
-              <a:t>Yes! This will take some time	.</a:t>
-            </a:r>
-          </a:p>
-        </p:txBody>
-      </p:sp>
-      <p:sp>
-        <p:nvSpPr>
-          <p:cNvPr id="3" name="Content Placeholder 2">
-            <a:extLst>
-              <a:ext uri="{FF2B5EF4-FFF2-40B4-BE49-F238E27FC236}">
-                <a16:creationId xmlns:a16="http://schemas.microsoft.com/office/drawing/2014/main" id="{877822D7-58A0-4A10-9900-936211FCBF03}"/>
-              </a:ext>
-            </a:extLst>
-          </p:cNvPr>
-          <p:cNvSpPr>
-            <a:spLocks noGrp="1"/>
-          </p:cNvSpPr>
-          <p:nvPr>
-            <p:ph idx="1"/>
-          </p:nvPr>
-        </p:nvSpPr>
-        <p:spPr/>
-        <p:txBody>
-          <a:bodyPr/>
-          <a:lstStyle/>
-          <a:p>
-            <a:r>
-              <a:rPr lang="en-US" dirty="0"/>
-              <a:t>But it will take a lot less time than banging your head against a wall!</a:t>
-            </a:r>
-          </a:p>
-          <a:p>
-            <a:r>
-              <a:rPr lang="en-US" dirty="0"/>
-              <a:t>It also respects other people’s time. I’m not likely to help you if it takes forever to understand what you want.</a:t>
-            </a:r>
-          </a:p>
-        </p:txBody>
-      </p:sp>
-      <p:pic>
-        <p:nvPicPr>
-          <p:cNvPr id="9220" name="Picture 4" descr="Should I stop wasting time looking at cat memes? - newspaper cat ...">
-            <a:extLst>
-              <a:ext uri="{FF2B5EF4-FFF2-40B4-BE49-F238E27FC236}">
-                <a16:creationId xmlns:a16="http://schemas.microsoft.com/office/drawing/2014/main" id="{327A8F61-2271-4AB9-8139-C48A669B55BB}"/>
-              </a:ext>
-            </a:extLst>
-          </p:cNvPr>
-          <p:cNvPicPr>
-            <a:picLocks noChangeAspect="1" noChangeArrowheads="1"/>
-          </p:cNvPicPr>
-          <p:nvPr/>
-        </p:nvPicPr>
-        <p:blipFill>
-          <a:blip r:embed="rId2">
-            <a:extLst>
-              <a:ext uri="{28A0092B-C50C-407E-A947-70E740481C1C}">
-                <a14:useLocalDpi xmlns:a14="http://schemas.microsoft.com/office/drawing/2010/main" val="0"/>
-              </a:ext>
-            </a:extLst>
-          </a:blip>
-          <a:srcRect/>
-          <a:stretch>
-            <a:fillRect/>
-          </a:stretch>
-        </p:blipFill>
-        <p:spPr bwMode="auto">
-          <a:xfrm>
-            <a:off x="3971146" y="3545373"/>
-            <a:ext cx="3775157" cy="2766527"/>
-          </a:xfrm>
-          <a:prstGeom prst="rect">
-            <a:avLst/>
-          </a:prstGeom>
-          <a:noFill/>
-          <a:extLst>
-            <a:ext uri="{909E8E84-426E-40DD-AFC4-6F175D3DCCD1}">
-              <a14:hiddenFill xmlns:a14="http://schemas.microsoft.com/office/drawing/2010/main">
-                <a:solidFill>
-                  <a:srgbClr val="FFFFFF"/>
-                </a:solidFill>
-              </a14:hiddenFill>
-            </a:ext>
-          </a:extLst>
-        </p:spPr>
-      </p:pic>
-    </p:spTree>
-    <p:extLst>
-      <p:ext uri="{BB962C8B-B14F-4D97-AF65-F5344CB8AC3E}">
-        <p14:creationId xmlns:p14="http://schemas.microsoft.com/office/powerpoint/2010/main" val="3441408425"/>
-      </p:ext>
-    </p:extLst>
-  </p:cSld>
-  <p:clrMapOvr>
-    <a:masterClrMapping/>
-  </p:clrMapOvr>
-</p:sld>
-</file>
-
-<file path=ppt/slides/slide2.xml><?xml version="1.0" encoding="utf-8"?>
-<p:sld xmlns:a="http://schemas.openxmlformats.org/drawingml/2006/main" xmlns:r="http://schemas.openxmlformats.org/officeDocument/2006/relationships" xmlns:p="http://schemas.openxmlformats.org/presentationml/2006/main">
-  <p:cSld>
-    <p:spTree>
-      <p:nvGrpSpPr>
-        <p:cNvPr id="1" name=""/>
-        <p:cNvGrpSpPr/>
-        <p:nvPr/>
-      </p:nvGrpSpPr>
-      <p:grpSpPr>
-        <a:xfrm>
-          <a:off x="0" y="0"/>
-          <a:ext cx="0" cy="0"/>
-          <a:chOff x="0" y="0"/>
-          <a:chExt cx="0" cy="0"/>
-        </a:xfrm>
-      </p:grpSpPr>
-      <p:sp>
-        <p:nvSpPr>
-          <p:cNvPr id="2" name="Title 1">
-            <a:extLst>
-              <a:ext uri="{FF2B5EF4-FFF2-40B4-BE49-F238E27FC236}">
-                <a16:creationId xmlns:a16="http://schemas.microsoft.com/office/drawing/2014/main" id="{5AF41E39-9DFC-4680-9921-D7DBBEE80971}"/>
-              </a:ext>
-            </a:extLst>
-          </p:cNvPr>
-          <p:cNvSpPr>
-            <a:spLocks noGrp="1"/>
-          </p:cNvSpPr>
-          <p:nvPr>
-            <p:ph type="title"/>
-          </p:nvPr>
-        </p:nvSpPr>
-        <p:spPr/>
-        <p:txBody>
-          <a:bodyPr/>
-          <a:lstStyle/>
-          <a:p>
-            <a:r>
-              <a:rPr lang="en-US" dirty="0"/>
-              <a:t>Help!	</a:t>
-            </a:r>
-          </a:p>
-        </p:txBody>
-      </p:sp>
-      <p:sp>
-        <p:nvSpPr>
-          <p:cNvPr id="3" name="Content Placeholder 2">
-            <a:extLst>
-              <a:ext uri="{FF2B5EF4-FFF2-40B4-BE49-F238E27FC236}">
-                <a16:creationId xmlns:a16="http://schemas.microsoft.com/office/drawing/2014/main" id="{C6549F68-AB17-4A7E-8728-9EB958DD24DC}"/>
-              </a:ext>
-            </a:extLst>
-          </p:cNvPr>
-          <p:cNvSpPr>
-            <a:spLocks noGrp="1"/>
-          </p:cNvSpPr>
-          <p:nvPr>
-            <p:ph idx="1"/>
-          </p:nvPr>
-        </p:nvSpPr>
-        <p:spPr/>
-        <p:txBody>
-          <a:bodyPr/>
-          <a:lstStyle/>
-          <a:p>
-            <a:r>
-              <a:rPr lang="en-US" dirty="0"/>
-              <a:t>My code doesn’t  work. Can anyone tell me why?</a:t>
-            </a:r>
-          </a:p>
-        </p:txBody>
-      </p:sp>
-      <p:pic>
-        <p:nvPicPr>
-          <p:cNvPr id="2050" name="Picture 2" descr="Halp Cat Meme - Cat Planet | Cat Planet">
-            <a:extLst>
-              <a:ext uri="{FF2B5EF4-FFF2-40B4-BE49-F238E27FC236}">
-                <a16:creationId xmlns:a16="http://schemas.microsoft.com/office/drawing/2014/main" id="{B07AD993-3886-4137-9C6B-547A8EBFFDEB}"/>
-              </a:ext>
-            </a:extLst>
-          </p:cNvPr>
-          <p:cNvPicPr>
-            <a:picLocks noChangeAspect="1" noChangeArrowheads="1"/>
-          </p:cNvPicPr>
-          <p:nvPr/>
-        </p:nvPicPr>
-        <p:blipFill>
-          <a:blip r:embed="rId3">
-            <a:extLst>
-              <a:ext uri="{28A0092B-C50C-407E-A947-70E740481C1C}">
-                <a14:useLocalDpi xmlns:a14="http://schemas.microsoft.com/office/drawing/2010/main" val="0"/>
-              </a:ext>
-            </a:extLst>
-          </a:blip>
-          <a:srcRect/>
-          <a:stretch>
-            <a:fillRect/>
-          </a:stretch>
-        </p:blipFill>
-        <p:spPr bwMode="auto">
-          <a:xfrm>
-            <a:off x="4510087" y="2639203"/>
-            <a:ext cx="3171825" cy="3333750"/>
-          </a:xfrm>
-          <a:prstGeom prst="rect">
-            <a:avLst/>
-          </a:prstGeom>
-          <a:noFill/>
-          <a:extLst>
-            <a:ext uri="{909E8E84-426E-40DD-AFC4-6F175D3DCCD1}">
-              <a14:hiddenFill xmlns:a14="http://schemas.microsoft.com/office/drawing/2010/main">
-                <a:solidFill>
-                  <a:srgbClr val="FFFFFF"/>
-                </a:solidFill>
-              </a14:hiddenFill>
-            </a:ext>
-          </a:extLst>
-        </p:spPr>
-      </p:pic>
-    </p:spTree>
-    <p:extLst>
-      <p:ext uri="{BB962C8B-B14F-4D97-AF65-F5344CB8AC3E}">
-        <p14:creationId xmlns:p14="http://schemas.microsoft.com/office/powerpoint/2010/main" val="2414071836"/>
-      </p:ext>
-    </p:extLst>
-  </p:cSld>
-  <p:clrMapOvr>
-    <a:masterClrMapping/>
-  </p:clrMapOvr>
-</p:sld>
-</file>
-
-<file path=ppt/slides/slide3.xml><?xml version="1.0" encoding="utf-8"?>
-<p:sld xmlns:a="http://schemas.openxmlformats.org/drawingml/2006/main" xmlns:r="http://schemas.openxmlformats.org/officeDocument/2006/relationships" xmlns:p="http://schemas.openxmlformats.org/presentationml/2006/main">
-  <p:cSld>
-    <p:spTree>
-      <p:nvGrpSpPr>
-        <p:cNvPr id="1" name=""/>
-        <p:cNvGrpSpPr/>
-        <p:nvPr/>
-      </p:nvGrpSpPr>
-      <p:grpSpPr>
-        <a:xfrm>
-          <a:off x="0" y="0"/>
-          <a:ext cx="0" cy="0"/>
-          <a:chOff x="0" y="0"/>
-          <a:chExt cx="0" cy="0"/>
-        </a:xfrm>
-      </p:grpSpPr>
-      <p:sp>
-        <p:nvSpPr>
-          <p:cNvPr id="2" name="Title 1">
-            <a:extLst>
-              <a:ext uri="{FF2B5EF4-FFF2-40B4-BE49-F238E27FC236}">
-                <a16:creationId xmlns:a16="http://schemas.microsoft.com/office/drawing/2014/main" id="{5AF41E39-9DFC-4680-9921-D7DBBEE80971}"/>
-              </a:ext>
-            </a:extLst>
-          </p:cNvPr>
-          <p:cNvSpPr>
-            <a:spLocks noGrp="1"/>
-          </p:cNvSpPr>
-          <p:nvPr>
-            <p:ph type="title"/>
-          </p:nvPr>
-        </p:nvSpPr>
-        <p:spPr/>
-        <p:txBody>
-          <a:bodyPr/>
-          <a:lstStyle/>
-          <a:p>
-            <a:r>
-              <a:rPr lang="en-US" dirty="0"/>
-              <a:t>Help!	</a:t>
-            </a:r>
-          </a:p>
-        </p:txBody>
-      </p:sp>
-      <p:sp>
-        <p:nvSpPr>
-          <p:cNvPr id="3" name="Content Placeholder 2">
-            <a:extLst>
-              <a:ext uri="{FF2B5EF4-FFF2-40B4-BE49-F238E27FC236}">
-                <a16:creationId xmlns:a16="http://schemas.microsoft.com/office/drawing/2014/main" id="{C6549F68-AB17-4A7E-8728-9EB958DD24DC}"/>
-              </a:ext>
-            </a:extLst>
-          </p:cNvPr>
-          <p:cNvSpPr>
-            <a:spLocks noGrp="1"/>
-          </p:cNvSpPr>
-          <p:nvPr>
-            <p:ph idx="1"/>
-          </p:nvPr>
-        </p:nvSpPr>
-        <p:spPr/>
-        <p:txBody>
-          <a:bodyPr/>
-          <a:lstStyle/>
-          <a:p>
-            <a:r>
-              <a:rPr lang="en-US" dirty="0"/>
-              <a:t>I am trying to use the function “</a:t>
-            </a:r>
-            <a:r>
-              <a:rPr lang="en-US" dirty="0" err="1"/>
-              <a:t>pivot_longer</a:t>
-            </a:r>
-            <a:r>
-              <a:rPr lang="en-US" dirty="0"/>
-              <a:t>” from package “</a:t>
-            </a:r>
-            <a:r>
-              <a:rPr lang="en-US" dirty="0" err="1"/>
-              <a:t>tidyr</a:t>
-            </a:r>
-            <a:r>
-              <a:rPr lang="en-US" dirty="0"/>
-              <a:t>” to switch my data from “wide” format to “long” format, and it won’t work. Has anyone used this package before? </a:t>
-            </a:r>
-          </a:p>
-        </p:txBody>
-      </p:sp>
-      <p:pic>
-        <p:nvPicPr>
-          <p:cNvPr id="3074" name="Picture 2" descr="Help Memes">
-            <a:extLst>
-              <a:ext uri="{FF2B5EF4-FFF2-40B4-BE49-F238E27FC236}">
-                <a16:creationId xmlns:a16="http://schemas.microsoft.com/office/drawing/2014/main" id="{020E9196-6596-4E01-B163-0F35291563E0}"/>
-              </a:ext>
-            </a:extLst>
-          </p:cNvPr>
-          <p:cNvPicPr>
-            <a:picLocks noChangeAspect="1" noChangeArrowheads="1"/>
-          </p:cNvPicPr>
-          <p:nvPr/>
-        </p:nvPicPr>
-        <p:blipFill>
-          <a:blip r:embed="rId3">
-            <a:extLst>
-              <a:ext uri="{28A0092B-C50C-407E-A947-70E740481C1C}">
-                <a14:useLocalDpi xmlns:a14="http://schemas.microsoft.com/office/drawing/2010/main" val="0"/>
-              </a:ext>
-            </a:extLst>
-          </a:blip>
-          <a:srcRect/>
-          <a:stretch>
-            <a:fillRect/>
-          </a:stretch>
-        </p:blipFill>
-        <p:spPr bwMode="auto">
-          <a:xfrm>
-            <a:off x="3472154" y="3445717"/>
-            <a:ext cx="4762500" cy="3295650"/>
-          </a:xfrm>
-          <a:prstGeom prst="rect">
-            <a:avLst/>
-          </a:prstGeom>
-          <a:noFill/>
-          <a:extLst>
-            <a:ext uri="{909E8E84-426E-40DD-AFC4-6F175D3DCCD1}">
-              <a14:hiddenFill xmlns:a14="http://schemas.microsoft.com/office/drawing/2010/main">
-                <a:solidFill>
-                  <a:srgbClr val="FFFFFF"/>
-                </a:solidFill>
-              </a14:hiddenFill>
-            </a:ext>
-          </a:extLst>
-        </p:spPr>
-      </p:pic>
-    </p:spTree>
-    <p:extLst>
-      <p:ext uri="{BB962C8B-B14F-4D97-AF65-F5344CB8AC3E}">
-        <p14:creationId xmlns:p14="http://schemas.microsoft.com/office/powerpoint/2010/main" val="2588178718"/>
-      </p:ext>
-    </p:extLst>
-  </p:cSld>
-  <p:clrMapOvr>
-    <a:masterClrMapping/>
-  </p:clrMapOvr>
-</p:sld>
-</file>
-
-<file path=ppt/slides/slide4.xml><?xml version="1.0" encoding="utf-8"?>
-<p:sld xmlns:a="http://schemas.openxmlformats.org/drawingml/2006/main" xmlns:r="http://schemas.openxmlformats.org/officeDocument/2006/relationships" xmlns:p="http://schemas.openxmlformats.org/presentationml/2006/main">
-  <p:cSld>
-    <p:spTree>
-      <p:nvGrpSpPr>
-        <p:cNvPr id="1" name=""/>
-        <p:cNvGrpSpPr/>
-        <p:nvPr/>
-      </p:nvGrpSpPr>
-      <p:grpSpPr>
-        <a:xfrm>
-          <a:off x="0" y="0"/>
-          <a:ext cx="0" cy="0"/>
-          <a:chOff x="0" y="0"/>
-          <a:chExt cx="0" cy="0"/>
-        </a:xfrm>
-      </p:grpSpPr>
-      <p:sp>
-        <p:nvSpPr>
-          <p:cNvPr id="2" name="Title 1">
-            <a:extLst>
-              <a:ext uri="{FF2B5EF4-FFF2-40B4-BE49-F238E27FC236}">
-                <a16:creationId xmlns:a16="http://schemas.microsoft.com/office/drawing/2014/main" id="{5AF41E39-9DFC-4680-9921-D7DBBEE80971}"/>
-              </a:ext>
-            </a:extLst>
-          </p:cNvPr>
-          <p:cNvSpPr>
-            <a:spLocks noGrp="1"/>
-          </p:cNvSpPr>
-          <p:nvPr>
-            <p:ph type="title"/>
-          </p:nvPr>
-        </p:nvSpPr>
-        <p:spPr/>
-        <p:txBody>
-          <a:bodyPr/>
-          <a:lstStyle/>
-          <a:p>
-            <a:r>
-              <a:rPr lang="en-US" dirty="0"/>
-              <a:t>Help!	</a:t>
-            </a:r>
-          </a:p>
-        </p:txBody>
-      </p:sp>
-      <p:sp>
-        <p:nvSpPr>
-          <p:cNvPr id="3" name="Content Placeholder 2">
-            <a:extLst>
-              <a:ext uri="{FF2B5EF4-FFF2-40B4-BE49-F238E27FC236}">
-                <a16:creationId xmlns:a16="http://schemas.microsoft.com/office/drawing/2014/main" id="{C6549F68-AB17-4A7E-8728-9EB958DD24DC}"/>
-              </a:ext>
-            </a:extLst>
-          </p:cNvPr>
-          <p:cNvSpPr>
-            <a:spLocks noGrp="1"/>
-          </p:cNvSpPr>
-          <p:nvPr>
-            <p:ph idx="1"/>
-          </p:nvPr>
-        </p:nvSpPr>
-        <p:spPr/>
-        <p:txBody>
-          <a:bodyPr>
-            <a:normAutofit/>
-          </a:bodyPr>
-          <a:lstStyle/>
-          <a:p>
-            <a:r>
-              <a:rPr lang="en-US" dirty="0"/>
-              <a:t>I am trying to use the function “</a:t>
-            </a:r>
-            <a:r>
-              <a:rPr lang="en-US" dirty="0" err="1"/>
-              <a:t>pivot_longer</a:t>
-            </a:r>
-            <a:r>
-              <a:rPr lang="en-US" dirty="0"/>
-              <a:t>” from package “</a:t>
-            </a:r>
-            <a:r>
-              <a:rPr lang="en-US" dirty="0" err="1"/>
-              <a:t>tidyr</a:t>
-            </a:r>
-            <a:r>
-              <a:rPr lang="en-US" dirty="0"/>
-              <a:t>” to switch my data from “wide” format to “long” format, but it won’t work.</a:t>
-            </a:r>
-          </a:p>
-          <a:p>
-            <a:pPr marL="0" indent="0">
-              <a:buNone/>
-            </a:pPr>
-            <a:r>
-              <a:rPr lang="en-US" dirty="0"/>
-              <a:t>I tried this code:</a:t>
-            </a:r>
-          </a:p>
-          <a:p>
-            <a:pPr marL="457200" lvl="1" indent="0">
-              <a:buNone/>
-            </a:pPr>
-            <a:r>
-              <a:rPr lang="en-US" sz="2000" dirty="0"/>
-              <a:t>foo = </a:t>
-            </a:r>
-            <a:r>
-              <a:rPr lang="en-US" sz="2000" dirty="0" err="1"/>
-              <a:t>pivot_longer</a:t>
-            </a:r>
-            <a:r>
-              <a:rPr lang="en-US" sz="2000" dirty="0"/>
-              <a:t>(iris, </a:t>
-            </a:r>
-            <a:r>
-              <a:rPr lang="en-US" sz="2000" dirty="0" err="1"/>
-              <a:t>names_to</a:t>
-            </a:r>
-            <a:r>
-              <a:rPr lang="en-US" sz="2000" dirty="0"/>
-              <a:t> = "measurement", </a:t>
-            </a:r>
-            <a:r>
-              <a:rPr lang="en-US" sz="2000" dirty="0" err="1"/>
-              <a:t>values_to</a:t>
-            </a:r>
-            <a:r>
-              <a:rPr lang="en-US" sz="2000" dirty="0"/>
-              <a:t> = "value")</a:t>
-            </a:r>
-          </a:p>
-          <a:p>
-            <a:pPr marL="0" indent="0">
-              <a:buNone/>
-            </a:pPr>
-            <a:endParaRPr lang="en-US" dirty="0"/>
-          </a:p>
-          <a:p>
-            <a:pPr marL="0" indent="0">
-              <a:buNone/>
-            </a:pPr>
-            <a:r>
-              <a:rPr lang="en-US" dirty="0"/>
-              <a:t> it gave me the following error message:</a:t>
-            </a:r>
-          </a:p>
-          <a:p>
-            <a:pPr marL="0" indent="0">
-              <a:buNone/>
-            </a:pPr>
-            <a:endParaRPr lang="en-US" dirty="0"/>
-          </a:p>
-          <a:p>
-            <a:pPr marL="457200" lvl="1" indent="0">
-              <a:buNone/>
-            </a:pPr>
-            <a:r>
-              <a:rPr lang="en-US" dirty="0">
-                <a:solidFill>
-                  <a:srgbClr val="FF0000"/>
-                </a:solidFill>
-              </a:rPr>
-              <a:t>Error: `cols` must select at least one column.</a:t>
-            </a:r>
-          </a:p>
-        </p:txBody>
-      </p:sp>
-      <p:pic>
-        <p:nvPicPr>
-          <p:cNvPr id="4098" name="Picture 2" descr="Hey guys i need help with a meme that i lost. There were 2 cats on ...">
-            <a:extLst>
-              <a:ext uri="{FF2B5EF4-FFF2-40B4-BE49-F238E27FC236}">
-                <a16:creationId xmlns:a16="http://schemas.microsoft.com/office/drawing/2014/main" id="{F53A48E0-6E91-4279-AEE2-4D4DC49AA772}"/>
-              </a:ext>
-            </a:extLst>
-          </p:cNvPr>
-          <p:cNvPicPr>
-            <a:picLocks noChangeAspect="1" noChangeArrowheads="1"/>
-          </p:cNvPicPr>
-          <p:nvPr/>
-        </p:nvPicPr>
-        <p:blipFill>
-          <a:blip r:embed="rId3">
-            <a:extLst>
-              <a:ext uri="{28A0092B-C50C-407E-A947-70E740481C1C}">
-                <a14:useLocalDpi xmlns:a14="http://schemas.microsoft.com/office/drawing/2010/main" val="0"/>
-              </a:ext>
-            </a:extLst>
-          </a:blip>
-          <a:srcRect/>
-          <a:stretch>
-            <a:fillRect/>
-          </a:stretch>
-        </p:blipFill>
-        <p:spPr bwMode="auto">
-          <a:xfrm>
-            <a:off x="8794492" y="4243317"/>
-            <a:ext cx="3063162" cy="2284053"/>
-          </a:xfrm>
-          <a:prstGeom prst="rect">
-            <a:avLst/>
-          </a:prstGeom>
-          <a:noFill/>
-          <a:extLst>
-            <a:ext uri="{909E8E84-426E-40DD-AFC4-6F175D3DCCD1}">
-              <a14:hiddenFill xmlns:a14="http://schemas.microsoft.com/office/drawing/2010/main">
-                <a:solidFill>
-                  <a:srgbClr val="FFFFFF"/>
-                </a:solidFill>
-              </a14:hiddenFill>
-            </a:ext>
-          </a:extLst>
-        </p:spPr>
-      </p:pic>
-    </p:spTree>
-    <p:extLst>
-      <p:ext uri="{BB962C8B-B14F-4D97-AF65-F5344CB8AC3E}">
-        <p14:creationId xmlns:p14="http://schemas.microsoft.com/office/powerpoint/2010/main" val="1101134436"/>
-      </p:ext>
-    </p:extLst>
-  </p:cSld>
-  <p:clrMapOvr>
-    <a:masterClrMapping/>
-  </p:clrMapOvr>
-</p:sld>
-</file>
-
-<file path=ppt/slides/slide5.xml><?xml version="1.0" encoding="utf-8"?>
-<p:sld xmlns:a="http://schemas.openxmlformats.org/drawingml/2006/main" xmlns:r="http://schemas.openxmlformats.org/officeDocument/2006/relationships" xmlns:p="http://schemas.openxmlformats.org/presentationml/2006/main">
-  <p:cSld>
-    <p:spTree>
-      <p:nvGrpSpPr>
-        <p:cNvPr id="1" name=""/>
-        <p:cNvGrpSpPr/>
-        <p:nvPr/>
-      </p:nvGrpSpPr>
-      <p:grpSpPr>
-        <a:xfrm>
-          <a:off x="0" y="0"/>
-          <a:ext cx="0" cy="0"/>
-          <a:chOff x="0" y="0"/>
-          <a:chExt cx="0" cy="0"/>
-        </a:xfrm>
-      </p:grpSpPr>
-      <p:sp>
-        <p:nvSpPr>
-          <p:cNvPr id="2" name="Title 1">
-            <a:extLst>
-              <a:ext uri="{FF2B5EF4-FFF2-40B4-BE49-F238E27FC236}">
-                <a16:creationId xmlns:a16="http://schemas.microsoft.com/office/drawing/2014/main" id="{5AF41E39-9DFC-4680-9921-D7DBBEE80971}"/>
-              </a:ext>
-            </a:extLst>
-          </p:cNvPr>
-          <p:cNvSpPr>
-            <a:spLocks noGrp="1"/>
-          </p:cNvSpPr>
-          <p:nvPr>
-            <p:ph type="title"/>
-          </p:nvPr>
-        </p:nvSpPr>
-        <p:spPr/>
-        <p:txBody>
-          <a:bodyPr/>
-          <a:lstStyle/>
-          <a:p>
-            <a:r>
-              <a:rPr lang="en-US" dirty="0"/>
-              <a:t>Help!	</a:t>
-            </a:r>
-          </a:p>
-        </p:txBody>
-      </p:sp>
-      <p:sp>
-        <p:nvSpPr>
-          <p:cNvPr id="3" name="Content Placeholder 2">
-            <a:extLst>
-              <a:ext uri="{FF2B5EF4-FFF2-40B4-BE49-F238E27FC236}">
-                <a16:creationId xmlns:a16="http://schemas.microsoft.com/office/drawing/2014/main" id="{C6549F68-AB17-4A7E-8728-9EB958DD24DC}"/>
-              </a:ext>
-            </a:extLst>
-          </p:cNvPr>
-          <p:cNvSpPr>
-            <a:spLocks noGrp="1"/>
-          </p:cNvSpPr>
-          <p:nvPr>
-            <p:ph idx="1"/>
-          </p:nvPr>
-        </p:nvSpPr>
-        <p:spPr>
-          <a:xfrm>
-            <a:off x="838200" y="1825625"/>
-            <a:ext cx="8884298" cy="4351338"/>
-          </a:xfrm>
-        </p:spPr>
-        <p:txBody>
-          <a:bodyPr>
-            <a:normAutofit lnSpcReduction="10000"/>
-          </a:bodyPr>
-          <a:lstStyle/>
-          <a:p>
-            <a:r>
-              <a:rPr lang="en-US" dirty="0"/>
-              <a:t>I am trying to use the function “</a:t>
-            </a:r>
-            <a:r>
-              <a:rPr lang="en-US" dirty="0" err="1"/>
-              <a:t>pivot_longer</a:t>
-            </a:r>
-            <a:r>
-              <a:rPr lang="en-US" dirty="0"/>
-              <a:t>” from package “</a:t>
-            </a:r>
-            <a:r>
-              <a:rPr lang="en-US" dirty="0" err="1"/>
-              <a:t>tidyr</a:t>
-            </a:r>
-            <a:r>
-              <a:rPr lang="en-US" dirty="0"/>
-              <a:t>” to switch my data from “wide” format to “long” format, but it won’t work.</a:t>
-            </a:r>
-          </a:p>
-          <a:p>
-            <a:pPr marL="0" indent="0">
-              <a:buNone/>
-            </a:pPr>
-            <a:r>
-              <a:rPr lang="en-US" dirty="0"/>
-              <a:t>I tried this code:</a:t>
-            </a:r>
-          </a:p>
-          <a:p>
-            <a:pPr marL="457200" lvl="1" indent="0">
-              <a:buNone/>
-            </a:pPr>
-            <a:r>
-              <a:rPr lang="en-US" sz="2200" dirty="0"/>
-              <a:t>foo = </a:t>
-            </a:r>
-            <a:r>
-              <a:rPr lang="en-US" sz="2200" dirty="0" err="1"/>
-              <a:t>pivot_longer</a:t>
-            </a:r>
-            <a:r>
-              <a:rPr lang="en-US" sz="2200" dirty="0"/>
-              <a:t>(iris, cols = c(</a:t>
-            </a:r>
-            <a:r>
-              <a:rPr lang="en-US" sz="2200" dirty="0" err="1"/>
-              <a:t>Petal.Width</a:t>
-            </a:r>
-            <a:r>
-              <a:rPr lang="en-US" sz="2200" dirty="0"/>
-              <a:t>, </a:t>
-            </a:r>
-            <a:r>
-              <a:rPr lang="en-US" sz="2200" dirty="0" err="1"/>
-              <a:t>Petal.Length</a:t>
-            </a:r>
-            <a:r>
-              <a:rPr lang="en-US" sz="2200" dirty="0"/>
-              <a:t>, </a:t>
-            </a:r>
-            <a:r>
-              <a:rPr lang="en-US" sz="2200" dirty="0" err="1"/>
-              <a:t>Sepal.width</a:t>
-            </a:r>
-            <a:r>
-              <a:rPr lang="en-US" sz="2200" dirty="0"/>
-              <a:t>, </a:t>
-            </a:r>
-            <a:r>
-              <a:rPr lang="en-US" sz="2200" dirty="0" err="1"/>
-              <a:t>Petal.width</a:t>
-            </a:r>
-            <a:r>
-              <a:rPr lang="en-US" sz="2200" dirty="0"/>
-              <a:t>), </a:t>
-            </a:r>
-            <a:r>
-              <a:rPr lang="en-US" sz="2200" dirty="0" err="1"/>
-              <a:t>names_to</a:t>
-            </a:r>
-            <a:r>
-              <a:rPr lang="en-US" sz="2200" dirty="0"/>
-              <a:t> = "measurement", </a:t>
-            </a:r>
-            <a:r>
-              <a:rPr lang="en-US" sz="2200" dirty="0" err="1"/>
-              <a:t>values_to</a:t>
-            </a:r>
-            <a:r>
-              <a:rPr lang="en-US" sz="2200" dirty="0"/>
-              <a:t> = "value")</a:t>
-            </a:r>
-          </a:p>
-          <a:p>
-            <a:pPr marL="0" indent="0">
-              <a:buNone/>
-            </a:pPr>
-            <a:endParaRPr lang="en-US" dirty="0"/>
-          </a:p>
-          <a:p>
-            <a:pPr marL="0" indent="0">
-              <a:buNone/>
-            </a:pPr>
-            <a:r>
-              <a:rPr lang="en-US" dirty="0"/>
-              <a:t> it gave me the following error message:</a:t>
-            </a:r>
-          </a:p>
-          <a:p>
-            <a:pPr marL="0" indent="0">
-              <a:buNone/>
-            </a:pPr>
-            <a:endParaRPr lang="en-US" dirty="0"/>
-          </a:p>
-          <a:p>
-            <a:pPr marL="457200" lvl="1" indent="0">
-              <a:buNone/>
-            </a:pPr>
-            <a:r>
-              <a:rPr lang="en-US" sz="2200" dirty="0">
-                <a:solidFill>
-                  <a:srgbClr val="FF0000"/>
-                </a:solidFill>
-              </a:rPr>
-              <a:t>Error: Can't subset columns that don't exist. x The column `</a:t>
-            </a:r>
-            <a:r>
-              <a:rPr lang="en-US" sz="2200" dirty="0" err="1">
-                <a:solidFill>
-                  <a:srgbClr val="FF0000"/>
-                </a:solidFill>
-              </a:rPr>
-              <a:t>Sepal.width</a:t>
-            </a:r>
-            <a:r>
-              <a:rPr lang="en-US" sz="2200" dirty="0">
-                <a:solidFill>
-                  <a:srgbClr val="FF0000"/>
-                </a:solidFill>
-              </a:rPr>
-              <a:t>` doesn't exist</a:t>
-            </a:r>
-          </a:p>
-        </p:txBody>
-      </p:sp>
-      <p:pic>
-        <p:nvPicPr>
-          <p:cNvPr id="1032" name="Picture 8" descr="Image tagged in funny cat memes - Imgflip">
-            <a:extLst>
-              <a:ext uri="{FF2B5EF4-FFF2-40B4-BE49-F238E27FC236}">
-                <a16:creationId xmlns:a16="http://schemas.microsoft.com/office/drawing/2014/main" id="{A0A3BFA0-94E2-4153-9FA9-98DCB5735FA0}"/>
-              </a:ext>
-            </a:extLst>
-          </p:cNvPr>
-          <p:cNvPicPr>
-            <a:picLocks noChangeAspect="1" noChangeArrowheads="1"/>
-          </p:cNvPicPr>
-          <p:nvPr/>
-        </p:nvPicPr>
-        <p:blipFill rotWithShape="1">
-          <a:blip r:embed="rId3">
-            <a:extLst>
-              <a:ext uri="{28A0092B-C50C-407E-A947-70E740481C1C}">
-                <a14:useLocalDpi xmlns:a14="http://schemas.microsoft.com/office/drawing/2010/main" val="0"/>
-              </a:ext>
-            </a:extLst>
-          </a:blip>
-          <a:srcRect l="17739" r="18426"/>
-          <a:stretch/>
-        </p:blipFill>
-        <p:spPr bwMode="auto">
-          <a:xfrm>
-            <a:off x="9722498" y="2500604"/>
-            <a:ext cx="2184986" cy="2569708"/>
-          </a:xfrm>
-          <a:prstGeom prst="rect">
-            <a:avLst/>
-          </a:prstGeom>
-          <a:noFill/>
-          <a:extLst>
-            <a:ext uri="{909E8E84-426E-40DD-AFC4-6F175D3DCCD1}">
-              <a14:hiddenFill xmlns:a14="http://schemas.microsoft.com/office/drawing/2010/main">
-                <a:solidFill>
-                  <a:srgbClr val="FFFFFF"/>
-                </a:solidFill>
-              </a14:hiddenFill>
-            </a:ext>
-          </a:extLst>
-        </p:spPr>
-      </p:pic>
-    </p:spTree>
-    <p:extLst>
-      <p:ext uri="{BB962C8B-B14F-4D97-AF65-F5344CB8AC3E}">
-        <p14:creationId xmlns:p14="http://schemas.microsoft.com/office/powerpoint/2010/main" val="1911529310"/>
-      </p:ext>
-    </p:extLst>
-  </p:cSld>
-  <p:clrMapOvr>
-    <a:masterClrMapping/>
-  </p:clrMapOvr>
-</p:sld>
-</file>
-
-<file path=ppt/slides/slide6.xml><?xml version="1.0" encoding="utf-8"?>
-<p:sld xmlns:a="http://schemas.openxmlformats.org/drawingml/2006/main" xmlns:r="http://schemas.openxmlformats.org/officeDocument/2006/relationships" xmlns:p="http://schemas.openxmlformats.org/presentationml/2006/main">
-  <p:cSld>
-    <p:spTree>
-      <p:nvGrpSpPr>
-        <p:cNvPr id="1" name=""/>
-        <p:cNvGrpSpPr/>
-        <p:nvPr/>
-      </p:nvGrpSpPr>
-      <p:grpSpPr>
-        <a:xfrm>
-          <a:off x="0" y="0"/>
-          <a:ext cx="0" cy="0"/>
-          <a:chOff x="0" y="0"/>
-          <a:chExt cx="0" cy="0"/>
-        </a:xfrm>
-      </p:grpSpPr>
-      <p:sp>
-        <p:nvSpPr>
-          <p:cNvPr id="2" name="Title 1">
-            <a:extLst>
-              <a:ext uri="{FF2B5EF4-FFF2-40B4-BE49-F238E27FC236}">
-                <a16:creationId xmlns:a16="http://schemas.microsoft.com/office/drawing/2014/main" id="{9E841C5C-1691-4109-881B-34B7C859C7B4}"/>
-              </a:ext>
-            </a:extLst>
-          </p:cNvPr>
-          <p:cNvSpPr>
-            <a:spLocks noGrp="1"/>
-          </p:cNvSpPr>
-          <p:nvPr>
-            <p:ph type="title"/>
-          </p:nvPr>
-        </p:nvSpPr>
-        <p:spPr/>
-        <p:txBody>
-          <a:bodyPr/>
-          <a:lstStyle/>
-          <a:p>
-            <a:r>
-              <a:rPr lang="en-US" dirty="0"/>
-              <a:t>We need a reproduceable example! (</a:t>
-            </a:r>
-            <a:r>
-              <a:rPr lang="en-US" dirty="0" err="1"/>
-              <a:t>ReprEx</a:t>
-            </a:r>
-            <a:r>
-              <a:rPr lang="en-US" dirty="0"/>
-              <a:t>)</a:t>
-            </a:r>
-          </a:p>
-        </p:txBody>
-      </p:sp>
-      <p:pic>
-        <p:nvPicPr>
-          <p:cNvPr id="5122" name="Picture 2" descr="How to support yourself financially during an unpaid internship ...">
-            <a:extLst>
-              <a:ext uri="{FF2B5EF4-FFF2-40B4-BE49-F238E27FC236}">
-                <a16:creationId xmlns:a16="http://schemas.microsoft.com/office/drawing/2014/main" id="{59C9317E-BAE1-44DC-BB0B-B514113DAD4E}"/>
-              </a:ext>
-            </a:extLst>
-          </p:cNvPr>
-          <p:cNvPicPr>
-            <a:picLocks noChangeAspect="1" noChangeArrowheads="1"/>
-          </p:cNvPicPr>
-          <p:nvPr/>
-        </p:nvPicPr>
-        <p:blipFill>
-          <a:blip r:embed="rId3">
-            <a:extLst>
-              <a:ext uri="{28A0092B-C50C-407E-A947-70E740481C1C}">
-                <a14:useLocalDpi xmlns:a14="http://schemas.microsoft.com/office/drawing/2010/main" val="0"/>
-              </a:ext>
-            </a:extLst>
-          </a:blip>
-          <a:srcRect/>
-          <a:stretch>
-            <a:fillRect/>
-          </a:stretch>
-        </p:blipFill>
-        <p:spPr bwMode="auto">
-          <a:xfrm>
-            <a:off x="2476403" y="2704615"/>
-            <a:ext cx="6791325" cy="2867025"/>
-          </a:xfrm>
-          <a:prstGeom prst="rect">
-            <a:avLst/>
-          </a:prstGeom>
-          <a:noFill/>
-          <a:extLst>
-            <a:ext uri="{909E8E84-426E-40DD-AFC4-6F175D3DCCD1}">
-              <a14:hiddenFill xmlns:a14="http://schemas.microsoft.com/office/drawing/2010/main">
-                <a:solidFill>
-                  <a:srgbClr val="FFFFFF"/>
-                </a:solidFill>
-              </a14:hiddenFill>
-            </a:ext>
-          </a:extLst>
-        </p:spPr>
-      </p:pic>
-    </p:spTree>
-    <p:extLst>
-      <p:ext uri="{BB962C8B-B14F-4D97-AF65-F5344CB8AC3E}">
-        <p14:creationId xmlns:p14="http://schemas.microsoft.com/office/powerpoint/2010/main" val="2252714804"/>
-      </p:ext>
-    </p:extLst>
-  </p:cSld>
-  <p:clrMapOvr>
-    <a:masterClrMapping/>
-  </p:clrMapOvr>
-</p:sld>
-</file>
-
-<file path=ppt/slides/slide7.xml><?xml version="1.0" encoding="utf-8"?>
-<p:sld xmlns:a="http://schemas.openxmlformats.org/drawingml/2006/main" xmlns:r="http://schemas.openxmlformats.org/officeDocument/2006/relationships" xmlns:p="http://schemas.openxmlformats.org/presentationml/2006/main">
-  <p:cSld>
-    <p:spTree>
-      <p:nvGrpSpPr>
-        <p:cNvPr id="1" name=""/>
-        <p:cNvGrpSpPr/>
-        <p:nvPr/>
-      </p:nvGrpSpPr>
-      <p:grpSpPr>
-        <a:xfrm>
-          <a:off x="0" y="0"/>
-          <a:ext cx="0" cy="0"/>
-          <a:chOff x="0" y="0"/>
-          <a:chExt cx="0" cy="0"/>
-        </a:xfrm>
-      </p:grpSpPr>
-      <p:sp>
-        <p:nvSpPr>
-          <p:cNvPr id="2" name="Title 1">
-            <a:extLst>
-              <a:ext uri="{FF2B5EF4-FFF2-40B4-BE49-F238E27FC236}">
-                <a16:creationId xmlns:a16="http://schemas.microsoft.com/office/drawing/2014/main" id="{9E841C5C-1691-4109-881B-34B7C859C7B4}"/>
-              </a:ext>
-            </a:extLst>
-          </p:cNvPr>
-          <p:cNvSpPr>
-            <a:spLocks noGrp="1"/>
-          </p:cNvSpPr>
-          <p:nvPr>
-            <p:ph type="title"/>
-          </p:nvPr>
-        </p:nvSpPr>
-        <p:spPr/>
-        <p:txBody>
-          <a:bodyPr/>
-          <a:lstStyle/>
-          <a:p>
-            <a:r>
-              <a:rPr lang="en-US" dirty="0"/>
-              <a:t>Step One: Subset your code</a:t>
-            </a:r>
-          </a:p>
-        </p:txBody>
-      </p:sp>
-      <p:sp>
-        <p:nvSpPr>
-          <p:cNvPr id="3" name="Content Placeholder 2">
-            <a:extLst>
-              <a:ext uri="{FF2B5EF4-FFF2-40B4-BE49-F238E27FC236}">
-                <a16:creationId xmlns:a16="http://schemas.microsoft.com/office/drawing/2014/main" id="{4787BA01-4964-46B4-B1B6-7F8B424EB919}"/>
-              </a:ext>
-            </a:extLst>
-          </p:cNvPr>
-          <p:cNvSpPr>
-            <a:spLocks noGrp="1"/>
-          </p:cNvSpPr>
-          <p:nvPr>
-            <p:ph idx="1"/>
-          </p:nvPr>
-        </p:nvSpPr>
-        <p:spPr>
-          <a:xfrm>
-            <a:off x="838200" y="1825625"/>
-            <a:ext cx="10515600" cy="805608"/>
-          </a:xfrm>
-        </p:spPr>
-        <p:txBody>
-          <a:bodyPr>
-            <a:normAutofit lnSpcReduction="10000"/>
-          </a:bodyPr>
-          <a:lstStyle/>
-          <a:p>
-            <a:r>
-              <a:rPr lang="en-US" dirty="0"/>
-              <a:t>Put the code you are having trouble with into a clean script or markdown file.</a:t>
-            </a:r>
-          </a:p>
-        </p:txBody>
-      </p:sp>
-      <p:pic>
-        <p:nvPicPr>
-          <p:cNvPr id="6" name="Picture 5">
-            <a:extLst>
-              <a:ext uri="{FF2B5EF4-FFF2-40B4-BE49-F238E27FC236}">
-                <a16:creationId xmlns:a16="http://schemas.microsoft.com/office/drawing/2014/main" id="{D838AA90-5C94-4A66-A6E3-FFC6C3F7BC8E}"/>
-              </a:ext>
-            </a:extLst>
-          </p:cNvPr>
-          <p:cNvPicPr>
-            <a:picLocks noChangeAspect="1"/>
-          </p:cNvPicPr>
-          <p:nvPr/>
-        </p:nvPicPr>
-        <p:blipFill>
-          <a:blip r:embed="rId3"/>
-          <a:stretch>
-            <a:fillRect/>
-          </a:stretch>
-        </p:blipFill>
-        <p:spPr>
-          <a:xfrm>
-            <a:off x="1851418" y="3178228"/>
-            <a:ext cx="2310036" cy="3212011"/>
-          </a:xfrm>
-          <a:prstGeom prst="rect">
-            <a:avLst/>
-          </a:prstGeom>
-        </p:spPr>
-      </p:pic>
-      <p:pic>
-        <p:nvPicPr>
-          <p:cNvPr id="7" name="Picture 6">
-            <a:extLst>
-              <a:ext uri="{FF2B5EF4-FFF2-40B4-BE49-F238E27FC236}">
-                <a16:creationId xmlns:a16="http://schemas.microsoft.com/office/drawing/2014/main" id="{A460936E-F6A9-4E22-A61D-298F62294A15}"/>
-              </a:ext>
-            </a:extLst>
-          </p:cNvPr>
-          <p:cNvPicPr>
-            <a:picLocks noChangeAspect="1"/>
-          </p:cNvPicPr>
-          <p:nvPr/>
-        </p:nvPicPr>
-        <p:blipFill>
-          <a:blip r:embed="rId4"/>
-          <a:stretch>
-            <a:fillRect/>
-          </a:stretch>
-        </p:blipFill>
-        <p:spPr>
-          <a:xfrm>
-            <a:off x="6759319" y="3560833"/>
-            <a:ext cx="1843506" cy="2325553"/>
-          </a:xfrm>
-          <a:prstGeom prst="rect">
-            <a:avLst/>
-          </a:prstGeom>
-        </p:spPr>
-      </p:pic>
-      <p:sp>
-        <p:nvSpPr>
-          <p:cNvPr id="8" name="Arrow: Right 7">
-            <a:extLst>
-              <a:ext uri="{FF2B5EF4-FFF2-40B4-BE49-F238E27FC236}">
-                <a16:creationId xmlns:a16="http://schemas.microsoft.com/office/drawing/2014/main" id="{C2B9536B-88C1-497F-97BF-780F849F1A79}"/>
-              </a:ext>
-            </a:extLst>
-          </p:cNvPr>
-          <p:cNvSpPr/>
-          <p:nvPr/>
-        </p:nvSpPr>
-        <p:spPr>
-          <a:xfrm>
-            <a:off x="4777273" y="4086808"/>
-            <a:ext cx="1082351" cy="485192"/>
-          </a:xfrm>
-          <a:prstGeom prst="rightArrow">
-            <a:avLst/>
-          </a:prstGeom>
-        </p:spPr>
-        <p:style>
-          <a:lnRef idx="2">
-            <a:schemeClr val="accent1">
-              <a:shade val="50000"/>
-            </a:schemeClr>
-          </a:lnRef>
-          <a:fillRef idx="1">
-            <a:schemeClr val="accent1"/>
-          </a:fillRef>
-          <a:effectRef idx="0">
-            <a:schemeClr val="accent1"/>
-          </a:effectRef>
-          <a:fontRef idx="minor">
-            <a:schemeClr val="lt1"/>
-          </a:fontRef>
-        </p:style>
-        <p:txBody>
-          <a:bodyPr rtlCol="0" anchor="ctr"/>
-          <a:lstStyle/>
-          <a:p>
-            <a:pPr algn="ctr"/>
-            <a:endParaRPr lang="en-US"/>
-          </a:p>
-        </p:txBody>
-      </p:sp>
-      <p:pic>
-        <p:nvPicPr>
-          <p:cNvPr id="6146" name="Picture 2" descr="R for cats · and cat lovers">
-            <a:extLst>
-              <a:ext uri="{FF2B5EF4-FFF2-40B4-BE49-F238E27FC236}">
-                <a16:creationId xmlns:a16="http://schemas.microsoft.com/office/drawing/2014/main" id="{BBFDF2F0-F6E8-4417-A11E-BEE49AA3E156}"/>
-              </a:ext>
-            </a:extLst>
-          </p:cNvPr>
-          <p:cNvPicPr>
-            <a:picLocks noChangeAspect="1" noChangeArrowheads="1"/>
-          </p:cNvPicPr>
-          <p:nvPr/>
-        </p:nvPicPr>
-        <p:blipFill>
-          <a:blip r:embed="rId5">
-            <a:extLst>
-              <a:ext uri="{28A0092B-C50C-407E-A947-70E740481C1C}">
-                <a14:useLocalDpi xmlns:a14="http://schemas.microsoft.com/office/drawing/2010/main" val="0"/>
-              </a:ext>
-            </a:extLst>
-          </a:blip>
-          <a:srcRect/>
-          <a:stretch>
-            <a:fillRect/>
-          </a:stretch>
-        </p:blipFill>
-        <p:spPr bwMode="auto">
-          <a:xfrm>
-            <a:off x="9140695" y="3178228"/>
-            <a:ext cx="2806444" cy="2101715"/>
-          </a:xfrm>
-          <a:prstGeom prst="rect">
-            <a:avLst/>
-          </a:prstGeom>
-          <a:noFill/>
-          <a:extLst>
-            <a:ext uri="{909E8E84-426E-40DD-AFC4-6F175D3DCCD1}">
-              <a14:hiddenFill xmlns:a14="http://schemas.microsoft.com/office/drawing/2010/main">
-                <a:solidFill>
-                  <a:srgbClr val="FFFFFF"/>
-                </a:solidFill>
-              </a14:hiddenFill>
-            </a:ext>
-          </a:extLst>
-        </p:spPr>
-      </p:pic>
-    </p:spTree>
-    <p:extLst>
-      <p:ext uri="{BB962C8B-B14F-4D97-AF65-F5344CB8AC3E}">
-        <p14:creationId xmlns:p14="http://schemas.microsoft.com/office/powerpoint/2010/main" val="1773351247"/>
-      </p:ext>
-    </p:extLst>
-  </p:cSld>
-  <p:clrMapOvr>
-    <a:masterClrMapping/>
-  </p:clrMapOvr>
-</p:sld>
-</file>
-
-<file path=ppt/slides/slide8.xml><?xml version="1.0" encoding="utf-8"?>
-<p:sld xmlns:a="http://schemas.openxmlformats.org/drawingml/2006/main" xmlns:r="http://schemas.openxmlformats.org/officeDocument/2006/relationships" xmlns:p="http://schemas.openxmlformats.org/presentationml/2006/main">
-  <p:cSld>
-    <p:spTree>
-      <p:nvGrpSpPr>
-        <p:cNvPr id="1" name=""/>
-        <p:cNvGrpSpPr/>
-        <p:nvPr/>
-      </p:nvGrpSpPr>
-      <p:grpSpPr>
-        <a:xfrm>
-          <a:off x="0" y="0"/>
-          <a:ext cx="0" cy="0"/>
-          <a:chOff x="0" y="0"/>
-          <a:chExt cx="0" cy="0"/>
-        </a:xfrm>
-      </p:grpSpPr>
-      <p:sp>
-        <p:nvSpPr>
-          <p:cNvPr id="2" name="Title 1">
-            <a:extLst>
-              <a:ext uri="{FF2B5EF4-FFF2-40B4-BE49-F238E27FC236}">
-                <a16:creationId xmlns:a16="http://schemas.microsoft.com/office/drawing/2014/main" id="{9E841C5C-1691-4109-881B-34B7C859C7B4}"/>
-              </a:ext>
-            </a:extLst>
-          </p:cNvPr>
-          <p:cNvSpPr>
-            <a:spLocks noGrp="1"/>
-          </p:cNvSpPr>
-          <p:nvPr>
-            <p:ph type="title"/>
-          </p:nvPr>
-        </p:nvSpPr>
-        <p:spPr/>
-        <p:txBody>
-          <a:bodyPr/>
-          <a:lstStyle/>
-          <a:p>
-            <a:r>
-              <a:rPr lang="en-US" dirty="0"/>
-              <a:t>Step 2: Comment!!</a:t>
-            </a:r>
-          </a:p>
-        </p:txBody>
-      </p:sp>
-      <p:sp>
-        <p:nvSpPr>
-          <p:cNvPr id="3" name="Content Placeholder 2">
-            <a:extLst>
-              <a:ext uri="{FF2B5EF4-FFF2-40B4-BE49-F238E27FC236}">
-                <a16:creationId xmlns:a16="http://schemas.microsoft.com/office/drawing/2014/main" id="{4787BA01-4964-46B4-B1B6-7F8B424EB919}"/>
-              </a:ext>
-            </a:extLst>
-          </p:cNvPr>
-          <p:cNvSpPr>
-            <a:spLocks noGrp="1"/>
-          </p:cNvSpPr>
-          <p:nvPr>
-            <p:ph idx="1"/>
-          </p:nvPr>
-        </p:nvSpPr>
-        <p:spPr/>
-        <p:txBody>
-          <a:bodyPr/>
-          <a:lstStyle/>
-          <a:p>
-            <a:r>
-              <a:rPr lang="en-US" dirty="0"/>
-              <a:t>Make sure your code is well commented so that someone else knows exactly what you are trying to do and where you are having trouble.</a:t>
-            </a:r>
-          </a:p>
-        </p:txBody>
-      </p:sp>
-      <p:pic>
-        <p:nvPicPr>
-          <p:cNvPr id="7170" name="Picture 2" descr="Begging Cat - Imgflip">
-            <a:extLst>
-              <a:ext uri="{FF2B5EF4-FFF2-40B4-BE49-F238E27FC236}">
-                <a16:creationId xmlns:a16="http://schemas.microsoft.com/office/drawing/2014/main" id="{BFC16E10-F10B-42CD-AEDE-07634B67BCDB}"/>
-              </a:ext>
-            </a:extLst>
-          </p:cNvPr>
-          <p:cNvPicPr>
-            <a:picLocks noChangeAspect="1" noChangeArrowheads="1"/>
-          </p:cNvPicPr>
-          <p:nvPr/>
-        </p:nvPicPr>
-        <p:blipFill>
-          <a:blip r:embed="rId2">
-            <a:extLst>
-              <a:ext uri="{28A0092B-C50C-407E-A947-70E740481C1C}">
-                <a14:useLocalDpi xmlns:a14="http://schemas.microsoft.com/office/drawing/2010/main" val="0"/>
-              </a:ext>
-            </a:extLst>
-          </a:blip>
-          <a:srcRect/>
-          <a:stretch>
-            <a:fillRect/>
-          </a:stretch>
-        </p:blipFill>
-        <p:spPr bwMode="auto">
-          <a:xfrm>
-            <a:off x="4199942" y="3102753"/>
-            <a:ext cx="3073896" cy="3209147"/>
-          </a:xfrm>
-          <a:prstGeom prst="rect">
-            <a:avLst/>
-          </a:prstGeom>
-          <a:noFill/>
-          <a:extLst>
-            <a:ext uri="{909E8E84-426E-40DD-AFC4-6F175D3DCCD1}">
-              <a14:hiddenFill xmlns:a14="http://schemas.microsoft.com/office/drawing/2010/main">
-                <a:solidFill>
-                  <a:srgbClr val="FFFFFF"/>
-                </a:solidFill>
-              </a14:hiddenFill>
-            </a:ext>
-          </a:extLst>
-        </p:spPr>
-      </p:pic>
-    </p:spTree>
-    <p:extLst>
-      <p:ext uri="{BB962C8B-B14F-4D97-AF65-F5344CB8AC3E}">
-        <p14:creationId xmlns:p14="http://schemas.microsoft.com/office/powerpoint/2010/main" val="2481141104"/>
-      </p:ext>
-    </p:extLst>
-  </p:cSld>
-  <p:clrMapOvr>
-    <a:masterClrMapping/>
-  </p:clrMapOvr>
-</p:sld>
-</file>
-
-<file path=ppt/slides/slide9.xml><?xml version="1.0" encoding="utf-8"?>
 <p:sld xmlns:a="http://schemas.openxmlformats.org/drawingml/2006/main" xmlns:r="http://schemas.openxmlformats.org/officeDocument/2006/relationships" xmlns:p="http://schemas.openxmlformats.org/presentationml/2006/main">
   <p:cSld>
     <p:spTree>
@@ -6366,6 +4970,1947 @@
       <p:bldP spid="3" grpId="0" build="p"/>
     </p:bldLst>
   </p:timing>
+</p:sld>
+</file>
+
+<file path=ppt/slides/slide11.xml><?xml version="1.0" encoding="utf-8"?>
+<p:sld xmlns:a="http://schemas.openxmlformats.org/drawingml/2006/main" xmlns:r="http://schemas.openxmlformats.org/officeDocument/2006/relationships" xmlns:p="http://schemas.openxmlformats.org/presentationml/2006/main">
+  <p:cSld>
+    <p:spTree>
+      <p:nvGrpSpPr>
+        <p:cNvPr id="1" name=""/>
+        <p:cNvGrpSpPr/>
+        <p:nvPr/>
+      </p:nvGrpSpPr>
+      <p:grpSpPr>
+        <a:xfrm>
+          <a:off x="0" y="0"/>
+          <a:ext cx="0" cy="0"/>
+          <a:chOff x="0" y="0"/>
+          <a:chExt cx="0" cy="0"/>
+        </a:xfrm>
+      </p:grpSpPr>
+      <p:sp>
+        <p:nvSpPr>
+          <p:cNvPr id="2" name="Title 1">
+            <a:extLst>
+              <a:ext uri="{FF2B5EF4-FFF2-40B4-BE49-F238E27FC236}">
+                <a16:creationId xmlns:a16="http://schemas.microsoft.com/office/drawing/2014/main" id="{9E841C5C-1691-4109-881B-34B7C859C7B4}"/>
+              </a:ext>
+            </a:extLst>
+          </p:cNvPr>
+          <p:cNvSpPr>
+            <a:spLocks noGrp="1"/>
+          </p:cNvSpPr>
+          <p:nvPr>
+            <p:ph type="title"/>
+          </p:nvPr>
+        </p:nvSpPr>
+        <p:spPr/>
+        <p:txBody>
+          <a:bodyPr/>
+          <a:lstStyle/>
+          <a:p>
+            <a:r>
+              <a:rPr lang="en-US" dirty="0"/>
+              <a:t>Step 4: Test it out.</a:t>
+            </a:r>
+          </a:p>
+        </p:txBody>
+      </p:sp>
+      <p:sp>
+        <p:nvSpPr>
+          <p:cNvPr id="3" name="Content Placeholder 2">
+            <a:extLst>
+              <a:ext uri="{FF2B5EF4-FFF2-40B4-BE49-F238E27FC236}">
+                <a16:creationId xmlns:a16="http://schemas.microsoft.com/office/drawing/2014/main" id="{4787BA01-4964-46B4-B1B6-7F8B424EB919}"/>
+              </a:ext>
+            </a:extLst>
+          </p:cNvPr>
+          <p:cNvSpPr>
+            <a:spLocks noGrp="1"/>
+          </p:cNvSpPr>
+          <p:nvPr>
+            <p:ph idx="1"/>
+          </p:nvPr>
+        </p:nvSpPr>
+        <p:spPr>
+          <a:xfrm>
+            <a:off x="838200" y="1690688"/>
+            <a:ext cx="10515600" cy="4351338"/>
+          </a:xfrm>
+        </p:spPr>
+        <p:txBody>
+          <a:bodyPr/>
+          <a:lstStyle/>
+          <a:p>
+            <a:r>
+              <a:rPr lang="en-US" dirty="0"/>
+              <a:t>Make sure it runs when your environment has been cleared. </a:t>
+            </a:r>
+          </a:p>
+          <a:p>
+            <a:r>
+              <a:rPr lang="en-US" dirty="0"/>
+              <a:t>Double-check that you have loaded any required packages.</a:t>
+            </a:r>
+          </a:p>
+          <a:p>
+            <a:r>
+              <a:rPr lang="en-US" dirty="0"/>
+              <a:t>If possible, check it on a different computer</a:t>
+            </a:r>
+          </a:p>
+        </p:txBody>
+      </p:sp>
+      <p:pic>
+        <p:nvPicPr>
+          <p:cNvPr id="8194" name="Picture 2" descr="bane kitty demands you test your code! - bane cat | Meme Generator">
+            <a:extLst>
+              <a:ext uri="{FF2B5EF4-FFF2-40B4-BE49-F238E27FC236}">
+                <a16:creationId xmlns:a16="http://schemas.microsoft.com/office/drawing/2014/main" id="{63703C80-1E1F-466A-B5C4-0DD89B0D2953}"/>
+              </a:ext>
+            </a:extLst>
+          </p:cNvPr>
+          <p:cNvPicPr>
+            <a:picLocks noChangeAspect="1" noChangeArrowheads="1"/>
+          </p:cNvPicPr>
+          <p:nvPr/>
+        </p:nvPicPr>
+        <p:blipFill>
+          <a:blip r:embed="rId2">
+            <a:extLst>
+              <a:ext uri="{28A0092B-C50C-407E-A947-70E740481C1C}">
+                <a14:useLocalDpi xmlns:a14="http://schemas.microsoft.com/office/drawing/2010/main" val="0"/>
+              </a:ext>
+            </a:extLst>
+          </a:blip>
+          <a:srcRect/>
+          <a:stretch>
+            <a:fillRect/>
+          </a:stretch>
+        </p:blipFill>
+        <p:spPr bwMode="auto">
+          <a:xfrm>
+            <a:off x="3666355" y="3700610"/>
+            <a:ext cx="3888904" cy="2341416"/>
+          </a:xfrm>
+          <a:prstGeom prst="rect">
+            <a:avLst/>
+          </a:prstGeom>
+          <a:noFill/>
+          <a:extLst>
+            <a:ext uri="{909E8E84-426E-40DD-AFC4-6F175D3DCCD1}">
+              <a14:hiddenFill xmlns:a14="http://schemas.microsoft.com/office/drawing/2010/main">
+                <a:solidFill>
+                  <a:srgbClr val="FFFFFF"/>
+                </a:solidFill>
+              </a14:hiddenFill>
+            </a:ext>
+          </a:extLst>
+        </p:spPr>
+      </p:pic>
+    </p:spTree>
+    <p:extLst>
+      <p:ext uri="{BB962C8B-B14F-4D97-AF65-F5344CB8AC3E}">
+        <p14:creationId xmlns:p14="http://schemas.microsoft.com/office/powerpoint/2010/main" val="192192724"/>
+      </p:ext>
+    </p:extLst>
+  </p:cSld>
+  <p:clrMapOvr>
+    <a:masterClrMapping/>
+  </p:clrMapOvr>
+</p:sld>
+</file>
+
+<file path=ppt/slides/slide12.xml><?xml version="1.0" encoding="utf-8"?>
+<p:sld xmlns:a="http://schemas.openxmlformats.org/drawingml/2006/main" xmlns:r="http://schemas.openxmlformats.org/officeDocument/2006/relationships" xmlns:p="http://schemas.openxmlformats.org/presentationml/2006/main">
+  <p:cSld>
+    <p:spTree>
+      <p:nvGrpSpPr>
+        <p:cNvPr id="1" name=""/>
+        <p:cNvGrpSpPr/>
+        <p:nvPr/>
+      </p:nvGrpSpPr>
+      <p:grpSpPr>
+        <a:xfrm>
+          <a:off x="0" y="0"/>
+          <a:ext cx="0" cy="0"/>
+          <a:chOff x="0" y="0"/>
+          <a:chExt cx="0" cy="0"/>
+        </a:xfrm>
+      </p:grpSpPr>
+      <p:sp>
+        <p:nvSpPr>
+          <p:cNvPr id="2" name="Title 1">
+            <a:extLst>
+              <a:ext uri="{FF2B5EF4-FFF2-40B4-BE49-F238E27FC236}">
+                <a16:creationId xmlns:a16="http://schemas.microsoft.com/office/drawing/2014/main" id="{CB97F58F-732E-4304-BBB2-1A9841AFF58A}"/>
+              </a:ext>
+            </a:extLst>
+          </p:cNvPr>
+          <p:cNvSpPr>
+            <a:spLocks noGrp="1"/>
+          </p:cNvSpPr>
+          <p:nvPr>
+            <p:ph type="title"/>
+          </p:nvPr>
+        </p:nvSpPr>
+        <p:spPr/>
+        <p:txBody>
+          <a:bodyPr/>
+          <a:lstStyle/>
+          <a:p>
+            <a:r>
+              <a:rPr lang="en-US" dirty="0"/>
+              <a:t>Yes! This will take some time	.</a:t>
+            </a:r>
+          </a:p>
+        </p:txBody>
+      </p:sp>
+      <p:sp>
+        <p:nvSpPr>
+          <p:cNvPr id="3" name="Content Placeholder 2">
+            <a:extLst>
+              <a:ext uri="{FF2B5EF4-FFF2-40B4-BE49-F238E27FC236}">
+                <a16:creationId xmlns:a16="http://schemas.microsoft.com/office/drawing/2014/main" id="{877822D7-58A0-4A10-9900-936211FCBF03}"/>
+              </a:ext>
+            </a:extLst>
+          </p:cNvPr>
+          <p:cNvSpPr>
+            <a:spLocks noGrp="1"/>
+          </p:cNvSpPr>
+          <p:nvPr>
+            <p:ph idx="1"/>
+          </p:nvPr>
+        </p:nvSpPr>
+        <p:spPr/>
+        <p:txBody>
+          <a:bodyPr/>
+          <a:lstStyle/>
+          <a:p>
+            <a:r>
+              <a:rPr lang="en-US" dirty="0"/>
+              <a:t>But it will take a lot less time than banging your head against a wall!</a:t>
+            </a:r>
+          </a:p>
+          <a:p>
+            <a:r>
+              <a:rPr lang="en-US" dirty="0"/>
+              <a:t>It also respects other people’s time. I’m not likely to help you if it takes forever to understand what you want.</a:t>
+            </a:r>
+          </a:p>
+        </p:txBody>
+      </p:sp>
+      <p:pic>
+        <p:nvPicPr>
+          <p:cNvPr id="9220" name="Picture 4" descr="Should I stop wasting time looking at cat memes? - newspaper cat ...">
+            <a:extLst>
+              <a:ext uri="{FF2B5EF4-FFF2-40B4-BE49-F238E27FC236}">
+                <a16:creationId xmlns:a16="http://schemas.microsoft.com/office/drawing/2014/main" id="{327A8F61-2271-4AB9-8139-C48A669B55BB}"/>
+              </a:ext>
+            </a:extLst>
+          </p:cNvPr>
+          <p:cNvPicPr>
+            <a:picLocks noChangeAspect="1" noChangeArrowheads="1"/>
+          </p:cNvPicPr>
+          <p:nvPr/>
+        </p:nvPicPr>
+        <p:blipFill>
+          <a:blip r:embed="rId2">
+            <a:extLst>
+              <a:ext uri="{28A0092B-C50C-407E-A947-70E740481C1C}">
+                <a14:useLocalDpi xmlns:a14="http://schemas.microsoft.com/office/drawing/2010/main" val="0"/>
+              </a:ext>
+            </a:extLst>
+          </a:blip>
+          <a:srcRect/>
+          <a:stretch>
+            <a:fillRect/>
+          </a:stretch>
+        </p:blipFill>
+        <p:spPr bwMode="auto">
+          <a:xfrm>
+            <a:off x="3971146" y="3545373"/>
+            <a:ext cx="3775157" cy="2766527"/>
+          </a:xfrm>
+          <a:prstGeom prst="rect">
+            <a:avLst/>
+          </a:prstGeom>
+          <a:noFill/>
+          <a:extLst>
+            <a:ext uri="{909E8E84-426E-40DD-AFC4-6F175D3DCCD1}">
+              <a14:hiddenFill xmlns:a14="http://schemas.microsoft.com/office/drawing/2010/main">
+                <a:solidFill>
+                  <a:srgbClr val="FFFFFF"/>
+                </a:solidFill>
+              </a14:hiddenFill>
+            </a:ext>
+          </a:extLst>
+        </p:spPr>
+      </p:pic>
+    </p:spTree>
+    <p:extLst>
+      <p:ext uri="{BB962C8B-B14F-4D97-AF65-F5344CB8AC3E}">
+        <p14:creationId xmlns:p14="http://schemas.microsoft.com/office/powerpoint/2010/main" val="3441408425"/>
+      </p:ext>
+    </p:extLst>
+  </p:cSld>
+  <p:clrMapOvr>
+    <a:masterClrMapping/>
+  </p:clrMapOvr>
+</p:sld>
+</file>
+
+<file path=ppt/slides/slide2.xml><?xml version="1.0" encoding="utf-8"?>
+<p:sld xmlns:a="http://schemas.openxmlformats.org/drawingml/2006/main" xmlns:r="http://schemas.openxmlformats.org/officeDocument/2006/relationships" xmlns:p="http://schemas.openxmlformats.org/presentationml/2006/main">
+  <p:cSld>
+    <p:spTree>
+      <p:nvGrpSpPr>
+        <p:cNvPr id="1" name=""/>
+        <p:cNvGrpSpPr/>
+        <p:nvPr/>
+      </p:nvGrpSpPr>
+      <p:grpSpPr>
+        <a:xfrm>
+          <a:off x="0" y="0"/>
+          <a:ext cx="0" cy="0"/>
+          <a:chOff x="0" y="0"/>
+          <a:chExt cx="0" cy="0"/>
+        </a:xfrm>
+      </p:grpSpPr>
+      <p:sp>
+        <p:nvSpPr>
+          <p:cNvPr id="2" name="Title 1">
+            <a:extLst>
+              <a:ext uri="{FF2B5EF4-FFF2-40B4-BE49-F238E27FC236}">
+                <a16:creationId xmlns:a16="http://schemas.microsoft.com/office/drawing/2014/main" id="{5AF41E39-9DFC-4680-9921-D7DBBEE80971}"/>
+              </a:ext>
+            </a:extLst>
+          </p:cNvPr>
+          <p:cNvSpPr>
+            <a:spLocks noGrp="1"/>
+          </p:cNvSpPr>
+          <p:nvPr>
+            <p:ph type="title"/>
+          </p:nvPr>
+        </p:nvSpPr>
+        <p:spPr/>
+        <p:txBody>
+          <a:bodyPr/>
+          <a:lstStyle/>
+          <a:p>
+            <a:r>
+              <a:rPr lang="en-US" dirty="0"/>
+              <a:t>Help!	</a:t>
+            </a:r>
+          </a:p>
+        </p:txBody>
+      </p:sp>
+      <p:sp>
+        <p:nvSpPr>
+          <p:cNvPr id="3" name="Content Placeholder 2">
+            <a:extLst>
+              <a:ext uri="{FF2B5EF4-FFF2-40B4-BE49-F238E27FC236}">
+                <a16:creationId xmlns:a16="http://schemas.microsoft.com/office/drawing/2014/main" id="{C6549F68-AB17-4A7E-8728-9EB958DD24DC}"/>
+              </a:ext>
+            </a:extLst>
+          </p:cNvPr>
+          <p:cNvSpPr>
+            <a:spLocks noGrp="1"/>
+          </p:cNvSpPr>
+          <p:nvPr>
+            <p:ph idx="1"/>
+          </p:nvPr>
+        </p:nvSpPr>
+        <p:spPr/>
+        <p:txBody>
+          <a:bodyPr/>
+          <a:lstStyle/>
+          <a:p>
+            <a:r>
+              <a:rPr lang="en-US" dirty="0"/>
+              <a:t>My code doesn’t  work. Can anyone tell me why?</a:t>
+            </a:r>
+          </a:p>
+        </p:txBody>
+      </p:sp>
+      <p:pic>
+        <p:nvPicPr>
+          <p:cNvPr id="2050" name="Picture 2" descr="Halp Cat Meme - Cat Planet | Cat Planet">
+            <a:extLst>
+              <a:ext uri="{FF2B5EF4-FFF2-40B4-BE49-F238E27FC236}">
+                <a16:creationId xmlns:a16="http://schemas.microsoft.com/office/drawing/2014/main" id="{B07AD993-3886-4137-9C6B-547A8EBFFDEB}"/>
+              </a:ext>
+            </a:extLst>
+          </p:cNvPr>
+          <p:cNvPicPr>
+            <a:picLocks noChangeAspect="1" noChangeArrowheads="1"/>
+          </p:cNvPicPr>
+          <p:nvPr/>
+        </p:nvPicPr>
+        <p:blipFill>
+          <a:blip r:embed="rId3">
+            <a:extLst>
+              <a:ext uri="{28A0092B-C50C-407E-A947-70E740481C1C}">
+                <a14:useLocalDpi xmlns:a14="http://schemas.microsoft.com/office/drawing/2010/main" val="0"/>
+              </a:ext>
+            </a:extLst>
+          </a:blip>
+          <a:srcRect/>
+          <a:stretch>
+            <a:fillRect/>
+          </a:stretch>
+        </p:blipFill>
+        <p:spPr bwMode="auto">
+          <a:xfrm>
+            <a:off x="4510087" y="2639203"/>
+            <a:ext cx="3171825" cy="3333750"/>
+          </a:xfrm>
+          <a:prstGeom prst="rect">
+            <a:avLst/>
+          </a:prstGeom>
+          <a:noFill/>
+          <a:extLst>
+            <a:ext uri="{909E8E84-426E-40DD-AFC4-6F175D3DCCD1}">
+              <a14:hiddenFill xmlns:a14="http://schemas.microsoft.com/office/drawing/2010/main">
+                <a:solidFill>
+                  <a:srgbClr val="FFFFFF"/>
+                </a:solidFill>
+              </a14:hiddenFill>
+            </a:ext>
+          </a:extLst>
+        </p:spPr>
+      </p:pic>
+    </p:spTree>
+    <p:extLst>
+      <p:ext uri="{BB962C8B-B14F-4D97-AF65-F5344CB8AC3E}">
+        <p14:creationId xmlns:p14="http://schemas.microsoft.com/office/powerpoint/2010/main" val="2414071836"/>
+      </p:ext>
+    </p:extLst>
+  </p:cSld>
+  <p:clrMapOvr>
+    <a:masterClrMapping/>
+  </p:clrMapOvr>
+</p:sld>
+</file>
+
+<file path=ppt/slides/slide3.xml><?xml version="1.0" encoding="utf-8"?>
+<p:sld xmlns:a="http://schemas.openxmlformats.org/drawingml/2006/main" xmlns:r="http://schemas.openxmlformats.org/officeDocument/2006/relationships" xmlns:p="http://schemas.openxmlformats.org/presentationml/2006/main">
+  <p:cSld>
+    <p:spTree>
+      <p:nvGrpSpPr>
+        <p:cNvPr id="1" name=""/>
+        <p:cNvGrpSpPr/>
+        <p:nvPr/>
+      </p:nvGrpSpPr>
+      <p:grpSpPr>
+        <a:xfrm>
+          <a:off x="0" y="0"/>
+          <a:ext cx="0" cy="0"/>
+          <a:chOff x="0" y="0"/>
+          <a:chExt cx="0" cy="0"/>
+        </a:xfrm>
+      </p:grpSpPr>
+      <p:sp>
+        <p:nvSpPr>
+          <p:cNvPr id="2" name="Title 1">
+            <a:extLst>
+              <a:ext uri="{FF2B5EF4-FFF2-40B4-BE49-F238E27FC236}">
+                <a16:creationId xmlns:a16="http://schemas.microsoft.com/office/drawing/2014/main" id="{5AF41E39-9DFC-4680-9921-D7DBBEE80971}"/>
+              </a:ext>
+            </a:extLst>
+          </p:cNvPr>
+          <p:cNvSpPr>
+            <a:spLocks noGrp="1"/>
+          </p:cNvSpPr>
+          <p:nvPr>
+            <p:ph type="title"/>
+          </p:nvPr>
+        </p:nvSpPr>
+        <p:spPr/>
+        <p:txBody>
+          <a:bodyPr/>
+          <a:lstStyle/>
+          <a:p>
+            <a:r>
+              <a:rPr lang="en-US" dirty="0"/>
+              <a:t>Help!	</a:t>
+            </a:r>
+          </a:p>
+        </p:txBody>
+      </p:sp>
+      <p:sp>
+        <p:nvSpPr>
+          <p:cNvPr id="3" name="Content Placeholder 2">
+            <a:extLst>
+              <a:ext uri="{FF2B5EF4-FFF2-40B4-BE49-F238E27FC236}">
+                <a16:creationId xmlns:a16="http://schemas.microsoft.com/office/drawing/2014/main" id="{C6549F68-AB17-4A7E-8728-9EB958DD24DC}"/>
+              </a:ext>
+            </a:extLst>
+          </p:cNvPr>
+          <p:cNvSpPr>
+            <a:spLocks noGrp="1"/>
+          </p:cNvSpPr>
+          <p:nvPr>
+            <p:ph idx="1"/>
+          </p:nvPr>
+        </p:nvSpPr>
+        <p:spPr/>
+        <p:txBody>
+          <a:bodyPr/>
+          <a:lstStyle/>
+          <a:p>
+            <a:r>
+              <a:rPr lang="en-US" dirty="0"/>
+              <a:t>I am trying to use the function “</a:t>
+            </a:r>
+            <a:r>
+              <a:rPr lang="en-US" dirty="0" err="1"/>
+              <a:t>pivot_longer</a:t>
+            </a:r>
+            <a:r>
+              <a:rPr lang="en-US" dirty="0"/>
+              <a:t>” from package “</a:t>
+            </a:r>
+            <a:r>
+              <a:rPr lang="en-US" dirty="0" err="1"/>
+              <a:t>tidyr</a:t>
+            </a:r>
+            <a:r>
+              <a:rPr lang="en-US" dirty="0"/>
+              <a:t>” to switch my data from “wide” format to “long” format, and it won’t work. Has anyone used this package before? </a:t>
+            </a:r>
+          </a:p>
+        </p:txBody>
+      </p:sp>
+      <p:pic>
+        <p:nvPicPr>
+          <p:cNvPr id="3074" name="Picture 2" descr="Help Memes">
+            <a:extLst>
+              <a:ext uri="{FF2B5EF4-FFF2-40B4-BE49-F238E27FC236}">
+                <a16:creationId xmlns:a16="http://schemas.microsoft.com/office/drawing/2014/main" id="{020E9196-6596-4E01-B163-0F35291563E0}"/>
+              </a:ext>
+            </a:extLst>
+          </p:cNvPr>
+          <p:cNvPicPr>
+            <a:picLocks noChangeAspect="1" noChangeArrowheads="1"/>
+          </p:cNvPicPr>
+          <p:nvPr/>
+        </p:nvPicPr>
+        <p:blipFill>
+          <a:blip r:embed="rId3">
+            <a:extLst>
+              <a:ext uri="{28A0092B-C50C-407E-A947-70E740481C1C}">
+                <a14:useLocalDpi xmlns:a14="http://schemas.microsoft.com/office/drawing/2010/main" val="0"/>
+              </a:ext>
+            </a:extLst>
+          </a:blip>
+          <a:srcRect/>
+          <a:stretch>
+            <a:fillRect/>
+          </a:stretch>
+        </p:blipFill>
+        <p:spPr bwMode="auto">
+          <a:xfrm>
+            <a:off x="3472154" y="3445717"/>
+            <a:ext cx="4762500" cy="3295650"/>
+          </a:xfrm>
+          <a:prstGeom prst="rect">
+            <a:avLst/>
+          </a:prstGeom>
+          <a:noFill/>
+          <a:extLst>
+            <a:ext uri="{909E8E84-426E-40DD-AFC4-6F175D3DCCD1}">
+              <a14:hiddenFill xmlns:a14="http://schemas.microsoft.com/office/drawing/2010/main">
+                <a:solidFill>
+                  <a:srgbClr val="FFFFFF"/>
+                </a:solidFill>
+              </a14:hiddenFill>
+            </a:ext>
+          </a:extLst>
+        </p:spPr>
+      </p:pic>
+    </p:spTree>
+    <p:extLst>
+      <p:ext uri="{BB962C8B-B14F-4D97-AF65-F5344CB8AC3E}">
+        <p14:creationId xmlns:p14="http://schemas.microsoft.com/office/powerpoint/2010/main" val="2588178718"/>
+      </p:ext>
+    </p:extLst>
+  </p:cSld>
+  <p:clrMapOvr>
+    <a:masterClrMapping/>
+  </p:clrMapOvr>
+</p:sld>
+</file>
+
+<file path=ppt/slides/slide4.xml><?xml version="1.0" encoding="utf-8"?>
+<p:sld xmlns:a="http://schemas.openxmlformats.org/drawingml/2006/main" xmlns:r="http://schemas.openxmlformats.org/officeDocument/2006/relationships" xmlns:p="http://schemas.openxmlformats.org/presentationml/2006/main">
+  <p:cSld>
+    <p:spTree>
+      <p:nvGrpSpPr>
+        <p:cNvPr id="1" name=""/>
+        <p:cNvGrpSpPr/>
+        <p:nvPr/>
+      </p:nvGrpSpPr>
+      <p:grpSpPr>
+        <a:xfrm>
+          <a:off x="0" y="0"/>
+          <a:ext cx="0" cy="0"/>
+          <a:chOff x="0" y="0"/>
+          <a:chExt cx="0" cy="0"/>
+        </a:xfrm>
+      </p:grpSpPr>
+      <p:sp>
+        <p:nvSpPr>
+          <p:cNvPr id="2" name="Title 1">
+            <a:extLst>
+              <a:ext uri="{FF2B5EF4-FFF2-40B4-BE49-F238E27FC236}">
+                <a16:creationId xmlns:a16="http://schemas.microsoft.com/office/drawing/2014/main" id="{5AF41E39-9DFC-4680-9921-D7DBBEE80971}"/>
+              </a:ext>
+            </a:extLst>
+          </p:cNvPr>
+          <p:cNvSpPr>
+            <a:spLocks noGrp="1"/>
+          </p:cNvSpPr>
+          <p:nvPr>
+            <p:ph type="title"/>
+          </p:nvPr>
+        </p:nvSpPr>
+        <p:spPr/>
+        <p:txBody>
+          <a:bodyPr/>
+          <a:lstStyle/>
+          <a:p>
+            <a:r>
+              <a:rPr lang="en-US" dirty="0"/>
+              <a:t>Help!	</a:t>
+            </a:r>
+          </a:p>
+        </p:txBody>
+      </p:sp>
+      <p:sp>
+        <p:nvSpPr>
+          <p:cNvPr id="3" name="Content Placeholder 2">
+            <a:extLst>
+              <a:ext uri="{FF2B5EF4-FFF2-40B4-BE49-F238E27FC236}">
+                <a16:creationId xmlns:a16="http://schemas.microsoft.com/office/drawing/2014/main" id="{C6549F68-AB17-4A7E-8728-9EB958DD24DC}"/>
+              </a:ext>
+            </a:extLst>
+          </p:cNvPr>
+          <p:cNvSpPr>
+            <a:spLocks noGrp="1"/>
+          </p:cNvSpPr>
+          <p:nvPr>
+            <p:ph idx="1"/>
+          </p:nvPr>
+        </p:nvSpPr>
+        <p:spPr/>
+        <p:txBody>
+          <a:bodyPr>
+            <a:normAutofit/>
+          </a:bodyPr>
+          <a:lstStyle/>
+          <a:p>
+            <a:r>
+              <a:rPr lang="en-US" dirty="0"/>
+              <a:t>I am trying to use the function “</a:t>
+            </a:r>
+            <a:r>
+              <a:rPr lang="en-US" dirty="0" err="1"/>
+              <a:t>pivot_longer</a:t>
+            </a:r>
+            <a:r>
+              <a:rPr lang="en-US" dirty="0"/>
+              <a:t>” from package “</a:t>
+            </a:r>
+            <a:r>
+              <a:rPr lang="en-US" dirty="0" err="1"/>
+              <a:t>tidyr</a:t>
+            </a:r>
+            <a:r>
+              <a:rPr lang="en-US" dirty="0"/>
+              <a:t>” to switch my data from “wide” format to “long” format, but it won’t work.</a:t>
+            </a:r>
+          </a:p>
+          <a:p>
+            <a:pPr marL="0" indent="0">
+              <a:buNone/>
+            </a:pPr>
+            <a:r>
+              <a:rPr lang="en-US" dirty="0"/>
+              <a:t>I tried this code:</a:t>
+            </a:r>
+          </a:p>
+          <a:p>
+            <a:pPr marL="457200" lvl="1" indent="0">
+              <a:buNone/>
+            </a:pPr>
+            <a:r>
+              <a:rPr lang="en-US" sz="2000" dirty="0"/>
+              <a:t>foo = </a:t>
+            </a:r>
+            <a:r>
+              <a:rPr lang="en-US" sz="2000" dirty="0" err="1"/>
+              <a:t>pivot_longer</a:t>
+            </a:r>
+            <a:r>
+              <a:rPr lang="en-US" sz="2000" dirty="0"/>
+              <a:t>(iris, </a:t>
+            </a:r>
+            <a:r>
+              <a:rPr lang="en-US" sz="2000" dirty="0" err="1"/>
+              <a:t>names_to</a:t>
+            </a:r>
+            <a:r>
+              <a:rPr lang="en-US" sz="2000" dirty="0"/>
+              <a:t> = "measurement", </a:t>
+            </a:r>
+            <a:r>
+              <a:rPr lang="en-US" sz="2000" dirty="0" err="1"/>
+              <a:t>values_to</a:t>
+            </a:r>
+            <a:r>
+              <a:rPr lang="en-US" sz="2000" dirty="0"/>
+              <a:t> = "value")</a:t>
+            </a:r>
+          </a:p>
+          <a:p>
+            <a:pPr marL="0" indent="0">
+              <a:buNone/>
+            </a:pPr>
+            <a:endParaRPr lang="en-US" dirty="0"/>
+          </a:p>
+          <a:p>
+            <a:pPr marL="0" indent="0">
+              <a:buNone/>
+            </a:pPr>
+            <a:r>
+              <a:rPr lang="en-US" dirty="0"/>
+              <a:t> it gave me the following error message:</a:t>
+            </a:r>
+          </a:p>
+          <a:p>
+            <a:pPr marL="0" indent="0">
+              <a:buNone/>
+            </a:pPr>
+            <a:endParaRPr lang="en-US" dirty="0"/>
+          </a:p>
+          <a:p>
+            <a:pPr marL="457200" lvl="1" indent="0">
+              <a:buNone/>
+            </a:pPr>
+            <a:r>
+              <a:rPr lang="en-US" dirty="0">
+                <a:solidFill>
+                  <a:srgbClr val="FF0000"/>
+                </a:solidFill>
+              </a:rPr>
+              <a:t>Error: `cols` must select at least one column.</a:t>
+            </a:r>
+          </a:p>
+        </p:txBody>
+      </p:sp>
+      <p:pic>
+        <p:nvPicPr>
+          <p:cNvPr id="4098" name="Picture 2" descr="Hey guys i need help with a meme that i lost. There were 2 cats on ...">
+            <a:extLst>
+              <a:ext uri="{FF2B5EF4-FFF2-40B4-BE49-F238E27FC236}">
+                <a16:creationId xmlns:a16="http://schemas.microsoft.com/office/drawing/2014/main" id="{F53A48E0-6E91-4279-AEE2-4D4DC49AA772}"/>
+              </a:ext>
+            </a:extLst>
+          </p:cNvPr>
+          <p:cNvPicPr>
+            <a:picLocks noChangeAspect="1" noChangeArrowheads="1"/>
+          </p:cNvPicPr>
+          <p:nvPr/>
+        </p:nvPicPr>
+        <p:blipFill>
+          <a:blip r:embed="rId3">
+            <a:extLst>
+              <a:ext uri="{28A0092B-C50C-407E-A947-70E740481C1C}">
+                <a14:useLocalDpi xmlns:a14="http://schemas.microsoft.com/office/drawing/2010/main" val="0"/>
+              </a:ext>
+            </a:extLst>
+          </a:blip>
+          <a:srcRect/>
+          <a:stretch>
+            <a:fillRect/>
+          </a:stretch>
+        </p:blipFill>
+        <p:spPr bwMode="auto">
+          <a:xfrm>
+            <a:off x="8794492" y="4243317"/>
+            <a:ext cx="3063162" cy="2284053"/>
+          </a:xfrm>
+          <a:prstGeom prst="rect">
+            <a:avLst/>
+          </a:prstGeom>
+          <a:noFill/>
+          <a:extLst>
+            <a:ext uri="{909E8E84-426E-40DD-AFC4-6F175D3DCCD1}">
+              <a14:hiddenFill xmlns:a14="http://schemas.microsoft.com/office/drawing/2010/main">
+                <a:solidFill>
+                  <a:srgbClr val="FFFFFF"/>
+                </a:solidFill>
+              </a14:hiddenFill>
+            </a:ext>
+          </a:extLst>
+        </p:spPr>
+      </p:pic>
+    </p:spTree>
+    <p:extLst>
+      <p:ext uri="{BB962C8B-B14F-4D97-AF65-F5344CB8AC3E}">
+        <p14:creationId xmlns:p14="http://schemas.microsoft.com/office/powerpoint/2010/main" val="1101134436"/>
+      </p:ext>
+    </p:extLst>
+  </p:cSld>
+  <p:clrMapOvr>
+    <a:masterClrMapping/>
+  </p:clrMapOvr>
+</p:sld>
+</file>
+
+<file path=ppt/slides/slide5.xml><?xml version="1.0" encoding="utf-8"?>
+<p:sld xmlns:a="http://schemas.openxmlformats.org/drawingml/2006/main" xmlns:r="http://schemas.openxmlformats.org/officeDocument/2006/relationships" xmlns:p="http://schemas.openxmlformats.org/presentationml/2006/main">
+  <p:cSld>
+    <p:spTree>
+      <p:nvGrpSpPr>
+        <p:cNvPr id="1" name=""/>
+        <p:cNvGrpSpPr/>
+        <p:nvPr/>
+      </p:nvGrpSpPr>
+      <p:grpSpPr>
+        <a:xfrm>
+          <a:off x="0" y="0"/>
+          <a:ext cx="0" cy="0"/>
+          <a:chOff x="0" y="0"/>
+          <a:chExt cx="0" cy="0"/>
+        </a:xfrm>
+      </p:grpSpPr>
+      <p:sp>
+        <p:nvSpPr>
+          <p:cNvPr id="2" name="Title 1">
+            <a:extLst>
+              <a:ext uri="{FF2B5EF4-FFF2-40B4-BE49-F238E27FC236}">
+                <a16:creationId xmlns:a16="http://schemas.microsoft.com/office/drawing/2014/main" id="{5AF41E39-9DFC-4680-9921-D7DBBEE80971}"/>
+              </a:ext>
+            </a:extLst>
+          </p:cNvPr>
+          <p:cNvSpPr>
+            <a:spLocks noGrp="1"/>
+          </p:cNvSpPr>
+          <p:nvPr>
+            <p:ph type="title"/>
+          </p:nvPr>
+        </p:nvSpPr>
+        <p:spPr/>
+        <p:txBody>
+          <a:bodyPr/>
+          <a:lstStyle/>
+          <a:p>
+            <a:r>
+              <a:rPr lang="en-US" dirty="0"/>
+              <a:t>Help!	</a:t>
+            </a:r>
+          </a:p>
+        </p:txBody>
+      </p:sp>
+      <p:sp>
+        <p:nvSpPr>
+          <p:cNvPr id="3" name="Content Placeholder 2">
+            <a:extLst>
+              <a:ext uri="{FF2B5EF4-FFF2-40B4-BE49-F238E27FC236}">
+                <a16:creationId xmlns:a16="http://schemas.microsoft.com/office/drawing/2014/main" id="{C6549F68-AB17-4A7E-8728-9EB958DD24DC}"/>
+              </a:ext>
+            </a:extLst>
+          </p:cNvPr>
+          <p:cNvSpPr>
+            <a:spLocks noGrp="1"/>
+          </p:cNvSpPr>
+          <p:nvPr>
+            <p:ph idx="1"/>
+          </p:nvPr>
+        </p:nvSpPr>
+        <p:spPr>
+          <a:xfrm>
+            <a:off x="838200" y="1825625"/>
+            <a:ext cx="8884298" cy="4351338"/>
+          </a:xfrm>
+        </p:spPr>
+        <p:txBody>
+          <a:bodyPr>
+            <a:normAutofit lnSpcReduction="10000"/>
+          </a:bodyPr>
+          <a:lstStyle/>
+          <a:p>
+            <a:r>
+              <a:rPr lang="en-US" dirty="0"/>
+              <a:t>I am trying to use the function “</a:t>
+            </a:r>
+            <a:r>
+              <a:rPr lang="en-US" dirty="0" err="1"/>
+              <a:t>pivot_longer</a:t>
+            </a:r>
+            <a:r>
+              <a:rPr lang="en-US" dirty="0"/>
+              <a:t>” from package “</a:t>
+            </a:r>
+            <a:r>
+              <a:rPr lang="en-US" dirty="0" err="1"/>
+              <a:t>tidyr</a:t>
+            </a:r>
+            <a:r>
+              <a:rPr lang="en-US" dirty="0"/>
+              <a:t>” to switch my data from “wide” format to “long” format, but it won’t work.</a:t>
+            </a:r>
+          </a:p>
+          <a:p>
+            <a:pPr marL="0" indent="0">
+              <a:buNone/>
+            </a:pPr>
+            <a:r>
+              <a:rPr lang="en-US" dirty="0"/>
+              <a:t>I tried this code:</a:t>
+            </a:r>
+          </a:p>
+          <a:p>
+            <a:pPr marL="457200" lvl="1" indent="0">
+              <a:buNone/>
+            </a:pPr>
+            <a:r>
+              <a:rPr lang="en-US" sz="2200" dirty="0"/>
+              <a:t>foo = </a:t>
+            </a:r>
+            <a:r>
+              <a:rPr lang="en-US" sz="2200" dirty="0" err="1"/>
+              <a:t>pivot_longer</a:t>
+            </a:r>
+            <a:r>
+              <a:rPr lang="en-US" sz="2200" dirty="0"/>
+              <a:t>(iris, cols = c(</a:t>
+            </a:r>
+            <a:r>
+              <a:rPr lang="en-US" sz="2200" dirty="0" err="1"/>
+              <a:t>Petal.Width</a:t>
+            </a:r>
+            <a:r>
+              <a:rPr lang="en-US" sz="2200" dirty="0"/>
+              <a:t>, </a:t>
+            </a:r>
+            <a:r>
+              <a:rPr lang="en-US" sz="2200" dirty="0" err="1"/>
+              <a:t>Petal.Length</a:t>
+            </a:r>
+            <a:r>
+              <a:rPr lang="en-US" sz="2200" dirty="0"/>
+              <a:t>, </a:t>
+            </a:r>
+            <a:r>
+              <a:rPr lang="en-US" sz="2200" dirty="0" err="1"/>
+              <a:t>Sepal.width</a:t>
+            </a:r>
+            <a:r>
+              <a:rPr lang="en-US" sz="2200" dirty="0"/>
+              <a:t>, </a:t>
+            </a:r>
+            <a:r>
+              <a:rPr lang="en-US" sz="2200" dirty="0" err="1"/>
+              <a:t>Petal.width</a:t>
+            </a:r>
+            <a:r>
+              <a:rPr lang="en-US" sz="2200" dirty="0"/>
+              <a:t>), </a:t>
+            </a:r>
+            <a:r>
+              <a:rPr lang="en-US" sz="2200" dirty="0" err="1"/>
+              <a:t>names_to</a:t>
+            </a:r>
+            <a:r>
+              <a:rPr lang="en-US" sz="2200" dirty="0"/>
+              <a:t> = "measurement", </a:t>
+            </a:r>
+            <a:r>
+              <a:rPr lang="en-US" sz="2200" dirty="0" err="1"/>
+              <a:t>values_to</a:t>
+            </a:r>
+            <a:r>
+              <a:rPr lang="en-US" sz="2200" dirty="0"/>
+              <a:t> = "value")</a:t>
+            </a:r>
+          </a:p>
+          <a:p>
+            <a:pPr marL="0" indent="0">
+              <a:buNone/>
+            </a:pPr>
+            <a:endParaRPr lang="en-US" dirty="0"/>
+          </a:p>
+          <a:p>
+            <a:pPr marL="0" indent="0">
+              <a:buNone/>
+            </a:pPr>
+            <a:r>
+              <a:rPr lang="en-US" dirty="0"/>
+              <a:t> it gave me the following error message:</a:t>
+            </a:r>
+          </a:p>
+          <a:p>
+            <a:pPr marL="0" indent="0">
+              <a:buNone/>
+            </a:pPr>
+            <a:endParaRPr lang="en-US" dirty="0"/>
+          </a:p>
+          <a:p>
+            <a:pPr marL="457200" lvl="1" indent="0">
+              <a:buNone/>
+            </a:pPr>
+            <a:r>
+              <a:rPr lang="en-US" sz="2200" dirty="0">
+                <a:solidFill>
+                  <a:srgbClr val="FF0000"/>
+                </a:solidFill>
+              </a:rPr>
+              <a:t>Error: Can't subset columns that don't exist. x The column `</a:t>
+            </a:r>
+            <a:r>
+              <a:rPr lang="en-US" sz="2200" dirty="0" err="1">
+                <a:solidFill>
+                  <a:srgbClr val="FF0000"/>
+                </a:solidFill>
+              </a:rPr>
+              <a:t>Sepal.width</a:t>
+            </a:r>
+            <a:r>
+              <a:rPr lang="en-US" sz="2200" dirty="0">
+                <a:solidFill>
+                  <a:srgbClr val="FF0000"/>
+                </a:solidFill>
+              </a:rPr>
+              <a:t>` doesn't exist</a:t>
+            </a:r>
+          </a:p>
+        </p:txBody>
+      </p:sp>
+      <p:pic>
+        <p:nvPicPr>
+          <p:cNvPr id="1032" name="Picture 8" descr="Image tagged in funny cat memes - Imgflip">
+            <a:extLst>
+              <a:ext uri="{FF2B5EF4-FFF2-40B4-BE49-F238E27FC236}">
+                <a16:creationId xmlns:a16="http://schemas.microsoft.com/office/drawing/2014/main" id="{A0A3BFA0-94E2-4153-9FA9-98DCB5735FA0}"/>
+              </a:ext>
+            </a:extLst>
+          </p:cNvPr>
+          <p:cNvPicPr>
+            <a:picLocks noChangeAspect="1" noChangeArrowheads="1"/>
+          </p:cNvPicPr>
+          <p:nvPr/>
+        </p:nvPicPr>
+        <p:blipFill rotWithShape="1">
+          <a:blip r:embed="rId3">
+            <a:extLst>
+              <a:ext uri="{28A0092B-C50C-407E-A947-70E740481C1C}">
+                <a14:useLocalDpi xmlns:a14="http://schemas.microsoft.com/office/drawing/2010/main" val="0"/>
+              </a:ext>
+            </a:extLst>
+          </a:blip>
+          <a:srcRect l="17739" r="18426"/>
+          <a:stretch/>
+        </p:blipFill>
+        <p:spPr bwMode="auto">
+          <a:xfrm>
+            <a:off x="9722498" y="2500604"/>
+            <a:ext cx="2184986" cy="2569708"/>
+          </a:xfrm>
+          <a:prstGeom prst="rect">
+            <a:avLst/>
+          </a:prstGeom>
+          <a:noFill/>
+          <a:extLst>
+            <a:ext uri="{909E8E84-426E-40DD-AFC4-6F175D3DCCD1}">
+              <a14:hiddenFill xmlns:a14="http://schemas.microsoft.com/office/drawing/2010/main">
+                <a:solidFill>
+                  <a:srgbClr val="FFFFFF"/>
+                </a:solidFill>
+              </a14:hiddenFill>
+            </a:ext>
+          </a:extLst>
+        </p:spPr>
+      </p:pic>
+    </p:spTree>
+    <p:extLst>
+      <p:ext uri="{BB962C8B-B14F-4D97-AF65-F5344CB8AC3E}">
+        <p14:creationId xmlns:p14="http://schemas.microsoft.com/office/powerpoint/2010/main" val="1911529310"/>
+      </p:ext>
+    </p:extLst>
+  </p:cSld>
+  <p:clrMapOvr>
+    <a:masterClrMapping/>
+  </p:clrMapOvr>
+</p:sld>
+</file>
+
+<file path=ppt/slides/slide6.xml><?xml version="1.0" encoding="utf-8"?>
+<p:sld xmlns:a="http://schemas.openxmlformats.org/drawingml/2006/main" xmlns:r="http://schemas.openxmlformats.org/officeDocument/2006/relationships" xmlns:p="http://schemas.openxmlformats.org/presentationml/2006/main">
+  <p:cSld>
+    <p:spTree>
+      <p:nvGrpSpPr>
+        <p:cNvPr id="1" name=""/>
+        <p:cNvGrpSpPr/>
+        <p:nvPr/>
+      </p:nvGrpSpPr>
+      <p:grpSpPr>
+        <a:xfrm>
+          <a:off x="0" y="0"/>
+          <a:ext cx="0" cy="0"/>
+          <a:chOff x="0" y="0"/>
+          <a:chExt cx="0" cy="0"/>
+        </a:xfrm>
+      </p:grpSpPr>
+      <p:sp>
+        <p:nvSpPr>
+          <p:cNvPr id="2" name="Title 1">
+            <a:extLst>
+              <a:ext uri="{FF2B5EF4-FFF2-40B4-BE49-F238E27FC236}">
+                <a16:creationId xmlns:a16="http://schemas.microsoft.com/office/drawing/2014/main" id="{9E841C5C-1691-4109-881B-34B7C859C7B4}"/>
+              </a:ext>
+            </a:extLst>
+          </p:cNvPr>
+          <p:cNvSpPr>
+            <a:spLocks noGrp="1"/>
+          </p:cNvSpPr>
+          <p:nvPr>
+            <p:ph type="title"/>
+          </p:nvPr>
+        </p:nvSpPr>
+        <p:spPr/>
+        <p:txBody>
+          <a:bodyPr/>
+          <a:lstStyle/>
+          <a:p>
+            <a:r>
+              <a:rPr lang="en-US" dirty="0"/>
+              <a:t>We need a reproduceable example! (</a:t>
+            </a:r>
+            <a:r>
+              <a:rPr lang="en-US" dirty="0" err="1"/>
+              <a:t>ReprEx</a:t>
+            </a:r>
+            <a:r>
+              <a:rPr lang="en-US" dirty="0"/>
+              <a:t>)</a:t>
+            </a:r>
+          </a:p>
+        </p:txBody>
+      </p:sp>
+      <p:pic>
+        <p:nvPicPr>
+          <p:cNvPr id="5122" name="Picture 2" descr="How to support yourself financially during an unpaid internship ...">
+            <a:extLst>
+              <a:ext uri="{FF2B5EF4-FFF2-40B4-BE49-F238E27FC236}">
+                <a16:creationId xmlns:a16="http://schemas.microsoft.com/office/drawing/2014/main" id="{59C9317E-BAE1-44DC-BB0B-B514113DAD4E}"/>
+              </a:ext>
+            </a:extLst>
+          </p:cNvPr>
+          <p:cNvPicPr>
+            <a:picLocks noChangeAspect="1" noChangeArrowheads="1"/>
+          </p:cNvPicPr>
+          <p:nvPr/>
+        </p:nvPicPr>
+        <p:blipFill>
+          <a:blip r:embed="rId3">
+            <a:extLst>
+              <a:ext uri="{28A0092B-C50C-407E-A947-70E740481C1C}">
+                <a14:useLocalDpi xmlns:a14="http://schemas.microsoft.com/office/drawing/2010/main" val="0"/>
+              </a:ext>
+            </a:extLst>
+          </a:blip>
+          <a:srcRect/>
+          <a:stretch>
+            <a:fillRect/>
+          </a:stretch>
+        </p:blipFill>
+        <p:spPr bwMode="auto">
+          <a:xfrm>
+            <a:off x="2476403" y="2704615"/>
+            <a:ext cx="6791325" cy="2867025"/>
+          </a:xfrm>
+          <a:prstGeom prst="rect">
+            <a:avLst/>
+          </a:prstGeom>
+          <a:noFill/>
+          <a:extLst>
+            <a:ext uri="{909E8E84-426E-40DD-AFC4-6F175D3DCCD1}">
+              <a14:hiddenFill xmlns:a14="http://schemas.microsoft.com/office/drawing/2010/main">
+                <a:solidFill>
+                  <a:srgbClr val="FFFFFF"/>
+                </a:solidFill>
+              </a14:hiddenFill>
+            </a:ext>
+          </a:extLst>
+        </p:spPr>
+      </p:pic>
+    </p:spTree>
+    <p:extLst>
+      <p:ext uri="{BB962C8B-B14F-4D97-AF65-F5344CB8AC3E}">
+        <p14:creationId xmlns:p14="http://schemas.microsoft.com/office/powerpoint/2010/main" val="2252714804"/>
+      </p:ext>
+    </p:extLst>
+  </p:cSld>
+  <p:clrMapOvr>
+    <a:masterClrMapping/>
+  </p:clrMapOvr>
+</p:sld>
+</file>
+
+<file path=ppt/slides/slide7.xml><?xml version="1.0" encoding="utf-8"?>
+<p:sld xmlns:a="http://schemas.openxmlformats.org/drawingml/2006/main" xmlns:r="http://schemas.openxmlformats.org/officeDocument/2006/relationships" xmlns:p="http://schemas.openxmlformats.org/presentationml/2006/main">
+  <p:cSld>
+    <p:spTree>
+      <p:nvGrpSpPr>
+        <p:cNvPr id="1" name=""/>
+        <p:cNvGrpSpPr/>
+        <p:nvPr/>
+      </p:nvGrpSpPr>
+      <p:grpSpPr>
+        <a:xfrm>
+          <a:off x="0" y="0"/>
+          <a:ext cx="0" cy="0"/>
+          <a:chOff x="0" y="0"/>
+          <a:chExt cx="0" cy="0"/>
+        </a:xfrm>
+      </p:grpSpPr>
+      <p:sp>
+        <p:nvSpPr>
+          <p:cNvPr id="2" name="Title 1">
+            <a:extLst>
+              <a:ext uri="{FF2B5EF4-FFF2-40B4-BE49-F238E27FC236}">
+                <a16:creationId xmlns:a16="http://schemas.microsoft.com/office/drawing/2014/main" id="{9E841C5C-1691-4109-881B-34B7C859C7B4}"/>
+              </a:ext>
+            </a:extLst>
+          </p:cNvPr>
+          <p:cNvSpPr>
+            <a:spLocks noGrp="1"/>
+          </p:cNvSpPr>
+          <p:nvPr>
+            <p:ph type="title"/>
+          </p:nvPr>
+        </p:nvSpPr>
+        <p:spPr/>
+        <p:txBody>
+          <a:bodyPr/>
+          <a:lstStyle/>
+          <a:p>
+            <a:r>
+              <a:rPr lang="en-US" dirty="0"/>
+              <a:t>Step One: Subset your code</a:t>
+            </a:r>
+          </a:p>
+        </p:txBody>
+      </p:sp>
+      <p:sp>
+        <p:nvSpPr>
+          <p:cNvPr id="3" name="Content Placeholder 2">
+            <a:extLst>
+              <a:ext uri="{FF2B5EF4-FFF2-40B4-BE49-F238E27FC236}">
+                <a16:creationId xmlns:a16="http://schemas.microsoft.com/office/drawing/2014/main" id="{4787BA01-4964-46B4-B1B6-7F8B424EB919}"/>
+              </a:ext>
+            </a:extLst>
+          </p:cNvPr>
+          <p:cNvSpPr>
+            <a:spLocks noGrp="1"/>
+          </p:cNvSpPr>
+          <p:nvPr>
+            <p:ph idx="1"/>
+          </p:nvPr>
+        </p:nvSpPr>
+        <p:spPr>
+          <a:xfrm>
+            <a:off x="838200" y="1416265"/>
+            <a:ext cx="10515600" cy="805608"/>
+          </a:xfrm>
+        </p:spPr>
+        <p:txBody>
+          <a:bodyPr>
+            <a:normAutofit lnSpcReduction="10000"/>
+          </a:bodyPr>
+          <a:lstStyle/>
+          <a:p>
+            <a:r>
+              <a:rPr lang="en-US" dirty="0"/>
+              <a:t>Put the code you are having trouble with into a clean script or markdown file.</a:t>
+            </a:r>
+          </a:p>
+        </p:txBody>
+      </p:sp>
+      <p:pic>
+        <p:nvPicPr>
+          <p:cNvPr id="6" name="Picture 5">
+            <a:extLst>
+              <a:ext uri="{FF2B5EF4-FFF2-40B4-BE49-F238E27FC236}">
+                <a16:creationId xmlns:a16="http://schemas.microsoft.com/office/drawing/2014/main" id="{D838AA90-5C94-4A66-A6E3-FFC6C3F7BC8E}"/>
+              </a:ext>
+            </a:extLst>
+          </p:cNvPr>
+          <p:cNvPicPr>
+            <a:picLocks noChangeAspect="1"/>
+          </p:cNvPicPr>
+          <p:nvPr/>
+        </p:nvPicPr>
+        <p:blipFill>
+          <a:blip r:embed="rId3"/>
+          <a:stretch>
+            <a:fillRect/>
+          </a:stretch>
+        </p:blipFill>
+        <p:spPr>
+          <a:xfrm>
+            <a:off x="1310484" y="2346875"/>
+            <a:ext cx="2310036" cy="3212011"/>
+          </a:xfrm>
+          <a:prstGeom prst="rect">
+            <a:avLst/>
+          </a:prstGeom>
+        </p:spPr>
+      </p:pic>
+      <p:pic>
+        <p:nvPicPr>
+          <p:cNvPr id="7" name="Picture 6">
+            <a:extLst>
+              <a:ext uri="{FF2B5EF4-FFF2-40B4-BE49-F238E27FC236}">
+                <a16:creationId xmlns:a16="http://schemas.microsoft.com/office/drawing/2014/main" id="{A460936E-F6A9-4E22-A61D-298F62294A15}"/>
+              </a:ext>
+            </a:extLst>
+          </p:cNvPr>
+          <p:cNvPicPr>
+            <a:picLocks noChangeAspect="1"/>
+          </p:cNvPicPr>
+          <p:nvPr/>
+        </p:nvPicPr>
+        <p:blipFill>
+          <a:blip r:embed="rId4"/>
+          <a:stretch>
+            <a:fillRect/>
+          </a:stretch>
+        </p:blipFill>
+        <p:spPr>
+          <a:xfrm>
+            <a:off x="5837567" y="2799544"/>
+            <a:ext cx="1843506" cy="2325553"/>
+          </a:xfrm>
+          <a:prstGeom prst="rect">
+            <a:avLst/>
+          </a:prstGeom>
+        </p:spPr>
+      </p:pic>
+      <p:sp>
+        <p:nvSpPr>
+          <p:cNvPr id="8" name="Arrow: Right 7">
+            <a:extLst>
+              <a:ext uri="{FF2B5EF4-FFF2-40B4-BE49-F238E27FC236}">
+                <a16:creationId xmlns:a16="http://schemas.microsoft.com/office/drawing/2014/main" id="{C2B9536B-88C1-497F-97BF-780F849F1A79}"/>
+              </a:ext>
+            </a:extLst>
+          </p:cNvPr>
+          <p:cNvSpPr/>
+          <p:nvPr/>
+        </p:nvSpPr>
+        <p:spPr>
+          <a:xfrm>
+            <a:off x="4187868" y="3477129"/>
+            <a:ext cx="1082351" cy="485192"/>
+          </a:xfrm>
+          <a:prstGeom prst="rightArrow">
+            <a:avLst/>
+          </a:prstGeom>
+        </p:spPr>
+        <p:style>
+          <a:lnRef idx="2">
+            <a:schemeClr val="accent1">
+              <a:shade val="50000"/>
+            </a:schemeClr>
+          </a:lnRef>
+          <a:fillRef idx="1">
+            <a:schemeClr val="accent1"/>
+          </a:fillRef>
+          <a:effectRef idx="0">
+            <a:schemeClr val="accent1"/>
+          </a:effectRef>
+          <a:fontRef idx="minor">
+            <a:schemeClr val="lt1"/>
+          </a:fontRef>
+        </p:style>
+        <p:txBody>
+          <a:bodyPr rtlCol="0" anchor="ctr"/>
+          <a:lstStyle/>
+          <a:p>
+            <a:pPr algn="ctr"/>
+            <a:endParaRPr lang="en-US"/>
+          </a:p>
+        </p:txBody>
+      </p:sp>
+      <p:pic>
+        <p:nvPicPr>
+          <p:cNvPr id="6146" name="Picture 2" descr="R for cats · and cat lovers">
+            <a:extLst>
+              <a:ext uri="{FF2B5EF4-FFF2-40B4-BE49-F238E27FC236}">
+                <a16:creationId xmlns:a16="http://schemas.microsoft.com/office/drawing/2014/main" id="{BBFDF2F0-F6E8-4417-A11E-BEE49AA3E156}"/>
+              </a:ext>
+            </a:extLst>
+          </p:cNvPr>
+          <p:cNvPicPr>
+            <a:picLocks noChangeAspect="1" noChangeArrowheads="1"/>
+          </p:cNvPicPr>
+          <p:nvPr/>
+        </p:nvPicPr>
+        <p:blipFill>
+          <a:blip r:embed="rId5">
+            <a:extLst>
+              <a:ext uri="{28A0092B-C50C-407E-A947-70E740481C1C}">
+                <a14:useLocalDpi xmlns:a14="http://schemas.microsoft.com/office/drawing/2010/main" val="0"/>
+              </a:ext>
+            </a:extLst>
+          </a:blip>
+          <a:srcRect/>
+          <a:stretch>
+            <a:fillRect/>
+          </a:stretch>
+        </p:blipFill>
+        <p:spPr bwMode="auto">
+          <a:xfrm>
+            <a:off x="9066050" y="2741828"/>
+            <a:ext cx="2806444" cy="2101715"/>
+          </a:xfrm>
+          <a:prstGeom prst="rect">
+            <a:avLst/>
+          </a:prstGeom>
+          <a:noFill/>
+          <a:extLst>
+            <a:ext uri="{909E8E84-426E-40DD-AFC4-6F175D3DCCD1}">
+              <a14:hiddenFill xmlns:a14="http://schemas.microsoft.com/office/drawing/2010/main">
+                <a:solidFill>
+                  <a:srgbClr val="FFFFFF"/>
+                </a:solidFill>
+              </a14:hiddenFill>
+            </a:ext>
+          </a:extLst>
+        </p:spPr>
+      </p:pic>
+    </p:spTree>
+    <p:extLst>
+      <p:ext uri="{BB962C8B-B14F-4D97-AF65-F5344CB8AC3E}">
+        <p14:creationId xmlns:p14="http://schemas.microsoft.com/office/powerpoint/2010/main" val="1773351247"/>
+      </p:ext>
+    </p:extLst>
+  </p:cSld>
+  <p:clrMapOvr>
+    <a:masterClrMapping/>
+  </p:clrMapOvr>
+</p:sld>
+</file>
+
+<file path=ppt/slides/slide8.xml><?xml version="1.0" encoding="utf-8"?>
+<p:sld xmlns:a="http://schemas.openxmlformats.org/drawingml/2006/main" xmlns:r="http://schemas.openxmlformats.org/officeDocument/2006/relationships" xmlns:p="http://schemas.openxmlformats.org/presentationml/2006/main">
+  <p:cSld>
+    <p:spTree>
+      <p:nvGrpSpPr>
+        <p:cNvPr id="1" name=""/>
+        <p:cNvGrpSpPr/>
+        <p:nvPr/>
+      </p:nvGrpSpPr>
+      <p:grpSpPr>
+        <a:xfrm>
+          <a:off x="0" y="0"/>
+          <a:ext cx="0" cy="0"/>
+          <a:chOff x="0" y="0"/>
+          <a:chExt cx="0" cy="0"/>
+        </a:xfrm>
+      </p:grpSpPr>
+      <p:sp>
+        <p:nvSpPr>
+          <p:cNvPr id="2" name="Title 1">
+            <a:extLst>
+              <a:ext uri="{FF2B5EF4-FFF2-40B4-BE49-F238E27FC236}">
+                <a16:creationId xmlns:a16="http://schemas.microsoft.com/office/drawing/2014/main" id="{6EE51112-8C0C-4526-99C9-8F304F973394}"/>
+              </a:ext>
+            </a:extLst>
+          </p:cNvPr>
+          <p:cNvSpPr>
+            <a:spLocks noGrp="1"/>
+          </p:cNvSpPr>
+          <p:nvPr>
+            <p:ph type="title"/>
+          </p:nvPr>
+        </p:nvSpPr>
+        <p:spPr/>
+        <p:txBody>
+          <a:bodyPr/>
+          <a:lstStyle/>
+          <a:p>
+            <a:r>
+              <a:rPr lang="en-US" dirty="0"/>
+              <a:t>Some things to watch out for</a:t>
+            </a:r>
+          </a:p>
+        </p:txBody>
+      </p:sp>
+      <p:sp>
+        <p:nvSpPr>
+          <p:cNvPr id="3" name="Content Placeholder 2">
+            <a:extLst>
+              <a:ext uri="{FF2B5EF4-FFF2-40B4-BE49-F238E27FC236}">
+                <a16:creationId xmlns:a16="http://schemas.microsoft.com/office/drawing/2014/main" id="{979CB9C5-9B2C-4894-801B-83B3ED8DD5D3}"/>
+              </a:ext>
+            </a:extLst>
+          </p:cNvPr>
+          <p:cNvSpPr>
+            <a:spLocks noGrp="1"/>
+          </p:cNvSpPr>
+          <p:nvPr>
+            <p:ph idx="1"/>
+          </p:nvPr>
+        </p:nvSpPr>
+        <p:spPr/>
+        <p:txBody>
+          <a:bodyPr/>
+          <a:lstStyle/>
+          <a:p>
+            <a:r>
+              <a:rPr lang="en-US" dirty="0"/>
+              <a:t>Make sure you don’t have any references to files on your computer.</a:t>
+            </a:r>
+          </a:p>
+          <a:p>
+            <a:pPr lvl="1"/>
+            <a:r>
+              <a:rPr lang="en-US" dirty="0"/>
+              <a:t>read.csv(</a:t>
+            </a:r>
+            <a:r>
+              <a:rPr lang="en-US" dirty="0" err="1"/>
+              <a:t>workingdirectory</a:t>
+            </a:r>
+            <a:r>
+              <a:rPr lang="en-US" dirty="0"/>
+              <a:t>/data/file) </a:t>
+            </a:r>
+          </a:p>
+          <a:p>
+            <a:pPr lvl="1"/>
+            <a:r>
+              <a:rPr lang="en-US" dirty="0"/>
+              <a:t>NOT read.csv(C://Mycomputer/users/Rosie/workingdirectory/data/file)</a:t>
+            </a:r>
+          </a:p>
+          <a:p>
+            <a:r>
+              <a:rPr lang="en-US" dirty="0"/>
+              <a:t>Load all required packages at the beginning</a:t>
+            </a:r>
+          </a:p>
+          <a:p>
+            <a:endParaRPr lang="en-US" dirty="0"/>
+          </a:p>
+        </p:txBody>
+      </p:sp>
+      <p:sp>
+        <p:nvSpPr>
+          <p:cNvPr id="4" name="Content Placeholder 2">
+            <a:extLst>
+              <a:ext uri="{FF2B5EF4-FFF2-40B4-BE49-F238E27FC236}">
+                <a16:creationId xmlns:a16="http://schemas.microsoft.com/office/drawing/2014/main" id="{DB49A79D-516F-4E5A-8F43-355E07BE4D4F}"/>
+              </a:ext>
+            </a:extLst>
+          </p:cNvPr>
+          <p:cNvSpPr txBox="1">
+            <a:spLocks/>
+          </p:cNvSpPr>
+          <p:nvPr/>
+        </p:nvSpPr>
+        <p:spPr>
+          <a:xfrm>
+            <a:off x="838200" y="4001294"/>
+            <a:ext cx="11353800" cy="805608"/>
+          </a:xfrm>
+          <a:prstGeom prst="rect">
+            <a:avLst/>
+          </a:prstGeom>
+        </p:spPr>
+        <p:txBody>
+          <a:bodyPr vert="horz" lIns="91440" tIns="45720" rIns="91440" bIns="45720" rtlCol="0">
+            <a:normAutofit/>
+          </a:bodyPr>
+          <a:lstStyle>
+            <a:lvl1pPr marL="228600" indent="-228600" algn="l" defTabSz="914400" rtl="0" eaLnBrk="1" latinLnBrk="0" hangingPunct="1">
+              <a:lnSpc>
+                <a:spcPct val="90000"/>
+              </a:lnSpc>
+              <a:spcBef>
+                <a:spcPts val="1000"/>
+              </a:spcBef>
+              <a:buFont typeface="Arial" panose="020B0604020202020204" pitchFamily="34" charset="0"/>
+              <a:buChar char="•"/>
+              <a:defRPr sz="2800" kern="1200">
+                <a:solidFill>
+                  <a:schemeClr val="tx1"/>
+                </a:solidFill>
+                <a:latin typeface="+mn-lt"/>
+                <a:ea typeface="+mn-ea"/>
+                <a:cs typeface="+mn-cs"/>
+              </a:defRPr>
+            </a:lvl1pPr>
+            <a:lvl2pPr marL="685800" indent="-228600" algn="l" defTabSz="914400" rtl="0" eaLnBrk="1" latinLnBrk="0" hangingPunct="1">
+              <a:lnSpc>
+                <a:spcPct val="90000"/>
+              </a:lnSpc>
+              <a:spcBef>
+                <a:spcPts val="500"/>
+              </a:spcBef>
+              <a:buFont typeface="Arial" panose="020B0604020202020204" pitchFamily="34" charset="0"/>
+              <a:buChar char="•"/>
+              <a:defRPr sz="2400" kern="1200">
+                <a:solidFill>
+                  <a:schemeClr val="tx1"/>
+                </a:solidFill>
+                <a:latin typeface="+mn-lt"/>
+                <a:ea typeface="+mn-ea"/>
+                <a:cs typeface="+mn-cs"/>
+              </a:defRPr>
+            </a:lvl2pPr>
+            <a:lvl3pPr marL="1143000" indent="-228600" algn="l" defTabSz="914400" rtl="0" eaLnBrk="1" latinLnBrk="0" hangingPunct="1">
+              <a:lnSpc>
+                <a:spcPct val="90000"/>
+              </a:lnSpc>
+              <a:spcBef>
+                <a:spcPts val="500"/>
+              </a:spcBef>
+              <a:buFont typeface="Arial" panose="020B0604020202020204" pitchFamily="34" charset="0"/>
+              <a:buChar char="•"/>
+              <a:defRPr sz="2000" kern="1200">
+                <a:solidFill>
+                  <a:schemeClr val="tx1"/>
+                </a:solidFill>
+                <a:latin typeface="+mn-lt"/>
+                <a:ea typeface="+mn-ea"/>
+                <a:cs typeface="+mn-cs"/>
+              </a:defRPr>
+            </a:lvl3pPr>
+            <a:lvl4pPr marL="1600200" indent="-228600" algn="l" defTabSz="914400" rtl="0" eaLnBrk="1" latinLnBrk="0" hangingPunct="1">
+              <a:lnSpc>
+                <a:spcPct val="90000"/>
+              </a:lnSpc>
+              <a:spcBef>
+                <a:spcPts val="500"/>
+              </a:spcBef>
+              <a:buFont typeface="Arial" panose="020B0604020202020204" pitchFamily="34" charset="0"/>
+              <a:buChar char="•"/>
+              <a:defRPr sz="1800" kern="1200">
+                <a:solidFill>
+                  <a:schemeClr val="tx1"/>
+                </a:solidFill>
+                <a:latin typeface="+mn-lt"/>
+                <a:ea typeface="+mn-ea"/>
+                <a:cs typeface="+mn-cs"/>
+              </a:defRPr>
+            </a:lvl4pPr>
+            <a:lvl5pPr marL="2057400" indent="-228600" algn="l" defTabSz="914400" rtl="0" eaLnBrk="1" latinLnBrk="0" hangingPunct="1">
+              <a:lnSpc>
+                <a:spcPct val="90000"/>
+              </a:lnSpc>
+              <a:spcBef>
+                <a:spcPts val="500"/>
+              </a:spcBef>
+              <a:buFont typeface="Arial" panose="020B0604020202020204" pitchFamily="34" charset="0"/>
+              <a:buChar char="•"/>
+              <a:defRPr sz="1800" kern="1200">
+                <a:solidFill>
+                  <a:schemeClr val="tx1"/>
+                </a:solidFill>
+                <a:latin typeface="+mn-lt"/>
+                <a:ea typeface="+mn-ea"/>
+                <a:cs typeface="+mn-cs"/>
+              </a:defRPr>
+            </a:lvl5pPr>
+            <a:lvl6pPr marL="2514600" indent="-228600" algn="l" defTabSz="914400" rtl="0" eaLnBrk="1" latinLnBrk="0" hangingPunct="1">
+              <a:lnSpc>
+                <a:spcPct val="90000"/>
+              </a:lnSpc>
+              <a:spcBef>
+                <a:spcPts val="500"/>
+              </a:spcBef>
+              <a:buFont typeface="Arial" panose="020B0604020202020204" pitchFamily="34" charset="0"/>
+              <a:buChar char="•"/>
+              <a:defRPr sz="1800" kern="1200">
+                <a:solidFill>
+                  <a:schemeClr val="tx1"/>
+                </a:solidFill>
+                <a:latin typeface="+mn-lt"/>
+                <a:ea typeface="+mn-ea"/>
+                <a:cs typeface="+mn-cs"/>
+              </a:defRPr>
+            </a:lvl6pPr>
+            <a:lvl7pPr marL="2971800" indent="-228600" algn="l" defTabSz="914400" rtl="0" eaLnBrk="1" latinLnBrk="0" hangingPunct="1">
+              <a:lnSpc>
+                <a:spcPct val="90000"/>
+              </a:lnSpc>
+              <a:spcBef>
+                <a:spcPts val="500"/>
+              </a:spcBef>
+              <a:buFont typeface="Arial" panose="020B0604020202020204" pitchFamily="34" charset="0"/>
+              <a:buChar char="•"/>
+              <a:defRPr sz="1800" kern="1200">
+                <a:solidFill>
+                  <a:schemeClr val="tx1"/>
+                </a:solidFill>
+                <a:latin typeface="+mn-lt"/>
+                <a:ea typeface="+mn-ea"/>
+                <a:cs typeface="+mn-cs"/>
+              </a:defRPr>
+            </a:lvl7pPr>
+            <a:lvl8pPr marL="3429000" indent="-228600" algn="l" defTabSz="914400" rtl="0" eaLnBrk="1" latinLnBrk="0" hangingPunct="1">
+              <a:lnSpc>
+                <a:spcPct val="90000"/>
+              </a:lnSpc>
+              <a:spcBef>
+                <a:spcPts val="500"/>
+              </a:spcBef>
+              <a:buFont typeface="Arial" panose="020B0604020202020204" pitchFamily="34" charset="0"/>
+              <a:buChar char="•"/>
+              <a:defRPr sz="1800" kern="1200">
+                <a:solidFill>
+                  <a:schemeClr val="tx1"/>
+                </a:solidFill>
+                <a:latin typeface="+mn-lt"/>
+                <a:ea typeface="+mn-ea"/>
+                <a:cs typeface="+mn-cs"/>
+              </a:defRPr>
+            </a:lvl8pPr>
+            <a:lvl9pPr marL="3886200" indent="-228600" algn="l" defTabSz="914400" rtl="0" eaLnBrk="1" latinLnBrk="0" hangingPunct="1">
+              <a:lnSpc>
+                <a:spcPct val="90000"/>
+              </a:lnSpc>
+              <a:spcBef>
+                <a:spcPts val="500"/>
+              </a:spcBef>
+              <a:buFont typeface="Arial" panose="020B0604020202020204" pitchFamily="34" charset="0"/>
+              <a:buChar char="•"/>
+              <a:defRPr sz="1800" kern="1200">
+                <a:solidFill>
+                  <a:schemeClr val="tx1"/>
+                </a:solidFill>
+                <a:latin typeface="+mn-lt"/>
+                <a:ea typeface="+mn-ea"/>
+                <a:cs typeface="+mn-cs"/>
+              </a:defRPr>
+            </a:lvl9pPr>
+          </a:lstStyle>
+          <a:p>
+            <a:r>
+              <a:rPr lang="en-US" dirty="0"/>
+              <a:t>Use style conventions when possible: </a:t>
+            </a:r>
+            <a:r>
+              <a:rPr lang="en-US" dirty="0">
+                <a:hlinkClick r:id="rId2"/>
+              </a:rPr>
+              <a:t>http://stat405.had.co.nz/r-style.html</a:t>
+            </a:r>
+            <a:r>
+              <a:rPr lang="en-US" dirty="0"/>
+              <a:t> </a:t>
+            </a:r>
+          </a:p>
+        </p:txBody>
+      </p:sp>
+      <p:pic>
+        <p:nvPicPr>
+          <p:cNvPr id="1026" name="Picture 2" descr="DJ Cat Refuses to play Gangnam Style - Dj cat - quickmeme">
+            <a:extLst>
+              <a:ext uri="{FF2B5EF4-FFF2-40B4-BE49-F238E27FC236}">
+                <a16:creationId xmlns:a16="http://schemas.microsoft.com/office/drawing/2014/main" id="{75CA32DC-3020-4048-8483-B1B2CB6581BE}"/>
+              </a:ext>
+            </a:extLst>
+          </p:cNvPr>
+          <p:cNvPicPr>
+            <a:picLocks noChangeAspect="1" noChangeArrowheads="1"/>
+          </p:cNvPicPr>
+          <p:nvPr/>
+        </p:nvPicPr>
+        <p:blipFill>
+          <a:blip r:embed="rId3">
+            <a:extLst>
+              <a:ext uri="{28A0092B-C50C-407E-A947-70E740481C1C}">
+                <a14:useLocalDpi xmlns:a14="http://schemas.microsoft.com/office/drawing/2010/main" val="0"/>
+              </a:ext>
+            </a:extLst>
+          </a:blip>
+          <a:srcRect/>
+          <a:stretch>
+            <a:fillRect/>
+          </a:stretch>
+        </p:blipFill>
+        <p:spPr bwMode="auto">
+          <a:xfrm>
+            <a:off x="4180114" y="4516163"/>
+            <a:ext cx="3209731" cy="2281918"/>
+          </a:xfrm>
+          <a:prstGeom prst="rect">
+            <a:avLst/>
+          </a:prstGeom>
+          <a:noFill/>
+          <a:extLst>
+            <a:ext uri="{909E8E84-426E-40DD-AFC4-6F175D3DCCD1}">
+              <a14:hiddenFill xmlns:a14="http://schemas.microsoft.com/office/drawing/2010/main">
+                <a:solidFill>
+                  <a:srgbClr val="FFFFFF"/>
+                </a:solidFill>
+              </a14:hiddenFill>
+            </a:ext>
+          </a:extLst>
+        </p:spPr>
+      </p:pic>
+    </p:spTree>
+    <p:extLst>
+      <p:ext uri="{BB962C8B-B14F-4D97-AF65-F5344CB8AC3E}">
+        <p14:creationId xmlns:p14="http://schemas.microsoft.com/office/powerpoint/2010/main" val="2725107383"/>
+      </p:ext>
+    </p:extLst>
+  </p:cSld>
+  <p:clrMapOvr>
+    <a:masterClrMapping/>
+  </p:clrMapOvr>
+</p:sld>
+</file>
+
+<file path=ppt/slides/slide9.xml><?xml version="1.0" encoding="utf-8"?>
+<p:sld xmlns:a="http://schemas.openxmlformats.org/drawingml/2006/main" xmlns:r="http://schemas.openxmlformats.org/officeDocument/2006/relationships" xmlns:p="http://schemas.openxmlformats.org/presentationml/2006/main">
+  <p:cSld>
+    <p:spTree>
+      <p:nvGrpSpPr>
+        <p:cNvPr id="1" name=""/>
+        <p:cNvGrpSpPr/>
+        <p:nvPr/>
+      </p:nvGrpSpPr>
+      <p:grpSpPr>
+        <a:xfrm>
+          <a:off x="0" y="0"/>
+          <a:ext cx="0" cy="0"/>
+          <a:chOff x="0" y="0"/>
+          <a:chExt cx="0" cy="0"/>
+        </a:xfrm>
+      </p:grpSpPr>
+      <p:sp>
+        <p:nvSpPr>
+          <p:cNvPr id="2" name="Title 1">
+            <a:extLst>
+              <a:ext uri="{FF2B5EF4-FFF2-40B4-BE49-F238E27FC236}">
+                <a16:creationId xmlns:a16="http://schemas.microsoft.com/office/drawing/2014/main" id="{9E841C5C-1691-4109-881B-34B7C859C7B4}"/>
+              </a:ext>
+            </a:extLst>
+          </p:cNvPr>
+          <p:cNvSpPr>
+            <a:spLocks noGrp="1"/>
+          </p:cNvSpPr>
+          <p:nvPr>
+            <p:ph type="title"/>
+          </p:nvPr>
+        </p:nvSpPr>
+        <p:spPr/>
+        <p:txBody>
+          <a:bodyPr/>
+          <a:lstStyle/>
+          <a:p>
+            <a:r>
+              <a:rPr lang="en-US" dirty="0"/>
+              <a:t>Step 2: Comment!!</a:t>
+            </a:r>
+          </a:p>
+        </p:txBody>
+      </p:sp>
+      <p:sp>
+        <p:nvSpPr>
+          <p:cNvPr id="3" name="Content Placeholder 2">
+            <a:extLst>
+              <a:ext uri="{FF2B5EF4-FFF2-40B4-BE49-F238E27FC236}">
+                <a16:creationId xmlns:a16="http://schemas.microsoft.com/office/drawing/2014/main" id="{4787BA01-4964-46B4-B1B6-7F8B424EB919}"/>
+              </a:ext>
+            </a:extLst>
+          </p:cNvPr>
+          <p:cNvSpPr>
+            <a:spLocks noGrp="1"/>
+          </p:cNvSpPr>
+          <p:nvPr>
+            <p:ph idx="1"/>
+          </p:nvPr>
+        </p:nvSpPr>
+        <p:spPr/>
+        <p:txBody>
+          <a:bodyPr/>
+          <a:lstStyle/>
+          <a:p>
+            <a:r>
+              <a:rPr lang="en-US" dirty="0"/>
+              <a:t>Make sure your code is well commented so that someone else knows exactly what you are trying to do and where you are having trouble.</a:t>
+            </a:r>
+          </a:p>
+        </p:txBody>
+      </p:sp>
+      <p:pic>
+        <p:nvPicPr>
+          <p:cNvPr id="7170" name="Picture 2" descr="Begging Cat - Imgflip">
+            <a:extLst>
+              <a:ext uri="{FF2B5EF4-FFF2-40B4-BE49-F238E27FC236}">
+                <a16:creationId xmlns:a16="http://schemas.microsoft.com/office/drawing/2014/main" id="{BFC16E10-F10B-42CD-AEDE-07634B67BCDB}"/>
+              </a:ext>
+            </a:extLst>
+          </p:cNvPr>
+          <p:cNvPicPr>
+            <a:picLocks noChangeAspect="1" noChangeArrowheads="1"/>
+          </p:cNvPicPr>
+          <p:nvPr/>
+        </p:nvPicPr>
+        <p:blipFill>
+          <a:blip r:embed="rId2">
+            <a:extLst>
+              <a:ext uri="{28A0092B-C50C-407E-A947-70E740481C1C}">
+                <a14:useLocalDpi xmlns:a14="http://schemas.microsoft.com/office/drawing/2010/main" val="0"/>
+              </a:ext>
+            </a:extLst>
+          </a:blip>
+          <a:srcRect/>
+          <a:stretch>
+            <a:fillRect/>
+          </a:stretch>
+        </p:blipFill>
+        <p:spPr bwMode="auto">
+          <a:xfrm>
+            <a:off x="4199942" y="3102753"/>
+            <a:ext cx="3073896" cy="3209147"/>
+          </a:xfrm>
+          <a:prstGeom prst="rect">
+            <a:avLst/>
+          </a:prstGeom>
+          <a:noFill/>
+          <a:extLst>
+            <a:ext uri="{909E8E84-426E-40DD-AFC4-6F175D3DCCD1}">
+              <a14:hiddenFill xmlns:a14="http://schemas.microsoft.com/office/drawing/2010/main">
+                <a:solidFill>
+                  <a:srgbClr val="FFFFFF"/>
+                </a:solidFill>
+              </a14:hiddenFill>
+            </a:ext>
+          </a:extLst>
+        </p:spPr>
+      </p:pic>
+    </p:spTree>
+    <p:extLst>
+      <p:ext uri="{BB962C8B-B14F-4D97-AF65-F5344CB8AC3E}">
+        <p14:creationId xmlns:p14="http://schemas.microsoft.com/office/powerpoint/2010/main" val="2481141104"/>
+      </p:ext>
+    </p:extLst>
+  </p:cSld>
+  <p:clrMapOvr>
+    <a:masterClrMapping/>
+  </p:clrMapOvr>
 </p:sld>
 </file>
 
@@ -7161,21 +7706,21 @@
 </file>
 
 <file path=customXml/item2.xml><?xml version="1.0" encoding="utf-8"?>
+<p:properties xmlns:p="http://schemas.microsoft.com/office/2006/metadata/properties" xmlns:xsi="http://www.w3.org/2001/XMLSchema-instance" xmlns:pc="http://schemas.microsoft.com/office/infopath/2007/PartnerControls">
+  <documentManagement>
+    <_ip_UnifiedCompliancePolicyUIAction xmlns="http://schemas.microsoft.com/sharepoint/v3" xsi:nil="true"/>
+    <_ip_UnifiedCompliancePolicyProperties xmlns="http://schemas.microsoft.com/sharepoint/v3" xsi:nil="true"/>
+  </documentManagement>
+</p:properties>
+</file>
+
+<file path=customXml/item3.xml><?xml version="1.0" encoding="utf-8"?>
 <?mso-contentType ?>
 <FormTemplates xmlns="http://schemas.microsoft.com/sharepoint/v3/contenttype/forms">
   <Display>DocumentLibraryForm</Display>
   <Edit>DocumentLibraryForm</Edit>
   <New>DocumentLibraryForm</New>
 </FormTemplates>
-</file>
-
-<file path=customXml/item3.xml><?xml version="1.0" encoding="utf-8"?>
-<p:properties xmlns:p="http://schemas.microsoft.com/office/2006/metadata/properties" xmlns:xsi="http://www.w3.org/2001/XMLSchema-instance" xmlns:pc="http://schemas.microsoft.com/office/infopath/2007/PartnerControls">
-  <documentManagement>
-    <_ip_UnifiedCompliancePolicyUIAction xmlns="http://schemas.microsoft.com/sharepoint/v3" xsi:nil="true"/>
-    <_ip_UnifiedCompliancePolicyProperties xmlns="http://schemas.microsoft.com/sharepoint/v3" xsi:nil="true"/>
-  </documentManagement>
-</p:properties>
 </file>
 
 <file path=customXml/itemProps1.xml><?xml version="1.0" encoding="utf-8"?>
@@ -7198,14 +7743,6 @@
 </file>
 
 <file path=customXml/itemProps2.xml><?xml version="1.0" encoding="utf-8"?>
-<ds:datastoreItem xmlns:ds="http://schemas.openxmlformats.org/officeDocument/2006/customXml" ds:itemID="{F2B6ED57-6288-4175-9A86-9223DA06A714}">
-  <ds:schemaRefs>
-    <ds:schemaRef ds:uri="http://schemas.microsoft.com/sharepoint/v3/contenttype/forms"/>
-  </ds:schemaRefs>
-</ds:datastoreItem>
-</file>
-
-<file path=customXml/itemProps3.xml><?xml version="1.0" encoding="utf-8"?>
 <ds:datastoreItem xmlns:ds="http://schemas.openxmlformats.org/officeDocument/2006/customXml" ds:itemID="{41F20580-3A3E-4D2A-A253-49F8C68C2C98}">
   <ds:schemaRefs>
     <ds:schemaRef ds:uri="http://schemas.microsoft.com/office/2006/metadata/properties"/>
@@ -7213,4 +7750,12 @@
     <ds:schemaRef ds:uri="http://schemas.microsoft.com/sharepoint/v3"/>
   </ds:schemaRefs>
 </ds:datastoreItem>
+</file>
+
+<file path=customXml/itemProps3.xml><?xml version="1.0" encoding="utf-8"?>
+<ds:datastoreItem xmlns:ds="http://schemas.openxmlformats.org/officeDocument/2006/customXml" ds:itemID="{F2B6ED57-6288-4175-9A86-9223DA06A714}">
+  <ds:schemaRefs>
+    <ds:schemaRef ds:uri="http://schemas.microsoft.com/sharepoint/v3/contenttype/forms"/>
+  </ds:schemaRefs>
+</ds:datastoreItem>
 </file>
</xml_diff>

<commit_message>
Added chat from may meeting
</commit_message>
<xml_diff>
--- a/2020.05.21/The Art of the ReprEx.pptx
+++ b/2020.05.21/The Art of the ReprEx.pptx
@@ -129,7 +129,7 @@
 <file path=ppt/revisionInfo.xml><?xml version="1.0" encoding="utf-8"?>
 <p1510:revInfo xmlns:a="http://schemas.openxmlformats.org/drawingml/2006/main" xmlns:r="http://schemas.openxmlformats.org/officeDocument/2006/relationships" xmlns:p1510="http://schemas.microsoft.com/office/powerpoint/2015/10/main">
   <p1510:revLst>
-    <p1510:client id="{A33F2DE7-3CF0-4029-AA46-D310800AD764}" v="28" dt="2020-05-21T20:12:34.468"/>
+    <p1510:client id="{A33F2DE7-3CF0-4029-AA46-D310800AD764}" v="87" dt="2020-05-21T21:36:01.752"/>
   </p1510:revLst>
 </p1510:revInfo>
 </file>
@@ -139,7 +139,7 @@
   <pc:docChgLst>
     <pc:chgData name="Hartman, Rosemary@DWR" userId="984f44d5-4180-46ad-9b77-e367b17d9727" providerId="ADAL" clId="{A33F2DE7-3CF0-4029-AA46-D310800AD764}"/>
     <pc:docChg chg="custSel addSld modSld">
-      <pc:chgData name="Hartman, Rosemary@DWR" userId="984f44d5-4180-46ad-9b77-e367b17d9727" providerId="ADAL" clId="{A33F2DE7-3CF0-4029-AA46-D310800AD764}" dt="2020-05-21T20:13:15.664" v="471" actId="20577"/>
+      <pc:chgData name="Hartman, Rosemary@DWR" userId="984f44d5-4180-46ad-9b77-e367b17d9727" providerId="ADAL" clId="{A33F2DE7-3CF0-4029-AA46-D310800AD764}" dt="2020-05-21T21:36:01.752" v="531" actId="20577"/>
       <pc:docMkLst>
         <pc:docMk/>
       </pc:docMkLst>
@@ -155,6 +155,21 @@
             <pc:docMk/>
             <pc:sldMk cId="3874532533" sldId="256"/>
             <ac:spMk id="3" creationId="{5DC4FC7A-793F-4E64-AAEC-D3174DCAA6A9}"/>
+          </ac:spMkLst>
+        </pc:spChg>
+      </pc:sldChg>
+      <pc:sldChg chg="modSp mod modAnim">
+        <pc:chgData name="Hartman, Rosemary@DWR" userId="984f44d5-4180-46ad-9b77-e367b17d9727" providerId="ADAL" clId="{A33F2DE7-3CF0-4029-AA46-D310800AD764}" dt="2020-05-21T21:36:01.752" v="531" actId="20577"/>
+        <pc:sldMkLst>
+          <pc:docMk/>
+          <pc:sldMk cId="1226819999" sldId="266"/>
+        </pc:sldMkLst>
+        <pc:spChg chg="mod">
+          <ac:chgData name="Hartman, Rosemary@DWR" userId="984f44d5-4180-46ad-9b77-e367b17d9727" providerId="ADAL" clId="{A33F2DE7-3CF0-4029-AA46-D310800AD764}" dt="2020-05-21T21:36:01.752" v="531" actId="20577"/>
+          <ac:spMkLst>
+            <pc:docMk/>
+            <pc:sldMk cId="1226819999" sldId="266"/>
+            <ac:spMk id="3" creationId="{4787BA01-4964-46B4-B1B6-7F8B424EB919}"/>
           </ac:spMkLst>
         </pc:spChg>
       </pc:sldChg>
@@ -4540,7 +4555,7 @@
         <p:spPr/>
         <p:txBody>
           <a:bodyPr>
-            <a:normAutofit lnSpcReduction="10000"/>
+            <a:normAutofit fontScale="92500"/>
           </a:bodyPr>
           <a:lstStyle/>
           <a:p>
@@ -4548,6 +4563,18 @@
               <a:rPr lang="en-US" dirty="0"/>
               <a:t>Just share all the data!</a:t>
             </a:r>
+          </a:p>
+          <a:p>
+            <a:pPr lvl="1"/>
+            <a:r>
+              <a:rPr lang="en-US" dirty="0"/>
+              <a:t>BUT! Pare it back so it’s just the data you </a:t>
+            </a:r>
+            <a:r>
+              <a:rPr lang="en-US"/>
+              <a:t>are using.</a:t>
+            </a:r>
+            <a:endParaRPr lang="en-US" dirty="0"/>
           </a:p>
           <a:p>
             <a:r>
@@ -4699,33 +4726,15 @@
                                   </p:childTnLst>
                                 </p:cTn>
                               </p:par>
-                            </p:childTnLst>
-                          </p:cTn>
-                        </p:par>
-                      </p:childTnLst>
-                    </p:cTn>
-                  </p:par>
-                  <p:par>
-                    <p:cTn id="7" fill="hold">
-                      <p:stCondLst>
-                        <p:cond delay="indefinite"/>
-                      </p:stCondLst>
-                      <p:childTnLst>
-                        <p:par>
-                          <p:cTn id="8" fill="hold">
-                            <p:stCondLst>
-                              <p:cond delay="0"/>
-                            </p:stCondLst>
-                            <p:childTnLst>
                               <p:par>
-                                <p:cTn id="9" presetID="1" presetClass="entr" presetSubtype="0" fill="hold" grpId="0" nodeType="clickEffect">
+                                <p:cTn id="7" presetID="1" presetClass="entr" presetSubtype="0" fill="hold" grpId="0" nodeType="withEffect">
                                   <p:stCondLst>
                                     <p:cond delay="0"/>
                                   </p:stCondLst>
                                   <p:childTnLst>
                                     <p:set>
                                       <p:cBhvr>
-                                        <p:cTn id="10" dur="1" fill="hold">
+                                        <p:cTn id="8" dur="1" fill="hold">
                                           <p:stCondLst>
                                             <p:cond delay="0"/>
                                           </p:stCondLst>
@@ -4748,8 +4757,26 @@
                                   </p:childTnLst>
                                 </p:cTn>
                               </p:par>
+                            </p:childTnLst>
+                          </p:cTn>
+                        </p:par>
+                      </p:childTnLst>
+                    </p:cTn>
+                  </p:par>
+                  <p:par>
+                    <p:cTn id="9" fill="hold">
+                      <p:stCondLst>
+                        <p:cond delay="indefinite"/>
+                      </p:stCondLst>
+                      <p:childTnLst>
+                        <p:par>
+                          <p:cTn id="10" fill="hold">
+                            <p:stCondLst>
+                              <p:cond delay="0"/>
+                            </p:stCondLst>
+                            <p:childTnLst>
                               <p:par>
-                                <p:cTn id="11" presetID="1" presetClass="entr" presetSubtype="0" fill="hold" grpId="0" nodeType="withEffect">
+                                <p:cTn id="11" presetID="1" presetClass="entr" presetSubtype="0" fill="hold" grpId="0" nodeType="clickEffect">
                                   <p:stCondLst>
                                     <p:cond delay="0"/>
                                   </p:stCondLst>
@@ -4779,33 +4806,15 @@
                                   </p:childTnLst>
                                 </p:cTn>
                               </p:par>
-                            </p:childTnLst>
-                          </p:cTn>
-                        </p:par>
-                      </p:childTnLst>
-                    </p:cTn>
-                  </p:par>
-                  <p:par>
-                    <p:cTn id="13" fill="hold">
-                      <p:stCondLst>
-                        <p:cond delay="indefinite"/>
-                      </p:stCondLst>
-                      <p:childTnLst>
-                        <p:par>
-                          <p:cTn id="14" fill="hold">
-                            <p:stCondLst>
-                              <p:cond delay="0"/>
-                            </p:stCondLst>
-                            <p:childTnLst>
                               <p:par>
-                                <p:cTn id="15" presetID="1" presetClass="entr" presetSubtype="0" fill="hold" grpId="0" nodeType="clickEffect">
+                                <p:cTn id="13" presetID="1" presetClass="entr" presetSubtype="0" fill="hold" grpId="0" nodeType="withEffect">
                                   <p:stCondLst>
                                     <p:cond delay="0"/>
                                   </p:stCondLst>
                                   <p:childTnLst>
                                     <p:set>
                                       <p:cBhvr>
-                                        <p:cTn id="16" dur="1" fill="hold">
+                                        <p:cTn id="14" dur="1" fill="hold">
                                           <p:stCondLst>
                                             <p:cond delay="0"/>
                                           </p:stCondLst>
@@ -4828,8 +4837,26 @@
                                   </p:childTnLst>
                                 </p:cTn>
                               </p:par>
+                            </p:childTnLst>
+                          </p:cTn>
+                        </p:par>
+                      </p:childTnLst>
+                    </p:cTn>
+                  </p:par>
+                  <p:par>
+                    <p:cTn id="15" fill="hold">
+                      <p:stCondLst>
+                        <p:cond delay="indefinite"/>
+                      </p:stCondLst>
+                      <p:childTnLst>
+                        <p:par>
+                          <p:cTn id="16" fill="hold">
+                            <p:stCondLst>
+                              <p:cond delay="0"/>
+                            </p:stCondLst>
+                            <p:childTnLst>
                               <p:par>
-                                <p:cTn id="17" presetID="1" presetClass="entr" presetSubtype="0" fill="hold" grpId="0" nodeType="withEffect">
+                                <p:cTn id="17" presetID="1" presetClass="entr" presetSubtype="0" fill="hold" grpId="0" nodeType="clickEffect">
                                   <p:stCondLst>
                                     <p:cond delay="0"/>
                                   </p:stCondLst>
@@ -4859,33 +4886,15 @@
                                   </p:childTnLst>
                                 </p:cTn>
                               </p:par>
-                            </p:childTnLst>
-                          </p:cTn>
-                        </p:par>
-                      </p:childTnLst>
-                    </p:cTn>
-                  </p:par>
-                  <p:par>
-                    <p:cTn id="19" fill="hold">
-                      <p:stCondLst>
-                        <p:cond delay="indefinite"/>
-                      </p:stCondLst>
-                      <p:childTnLst>
-                        <p:par>
-                          <p:cTn id="20" fill="hold">
-                            <p:stCondLst>
-                              <p:cond delay="0"/>
-                            </p:stCondLst>
-                            <p:childTnLst>
                               <p:par>
-                                <p:cTn id="21" presetID="1" presetClass="entr" presetSubtype="0" fill="hold" grpId="0" nodeType="clickEffect">
+                                <p:cTn id="19" presetID="1" presetClass="entr" presetSubtype="0" fill="hold" grpId="0" nodeType="withEffect">
                                   <p:stCondLst>
                                     <p:cond delay="0"/>
                                   </p:stCondLst>
                                   <p:childTnLst>
                                     <p:set>
                                       <p:cBhvr>
-                                        <p:cTn id="22" dur="1" fill="hold">
+                                        <p:cTn id="20" dur="1" fill="hold">
                                           <p:stCondLst>
                                             <p:cond delay="0"/>
                                           </p:stCondLst>
@@ -4908,8 +4917,26 @@
                                   </p:childTnLst>
                                 </p:cTn>
                               </p:par>
+                            </p:childTnLst>
+                          </p:cTn>
+                        </p:par>
+                      </p:childTnLst>
+                    </p:cTn>
+                  </p:par>
+                  <p:par>
+                    <p:cTn id="21" fill="hold">
+                      <p:stCondLst>
+                        <p:cond delay="indefinite"/>
+                      </p:stCondLst>
+                      <p:childTnLst>
+                        <p:par>
+                          <p:cTn id="22" fill="hold">
+                            <p:stCondLst>
+                              <p:cond delay="0"/>
+                            </p:stCondLst>
+                            <p:childTnLst>
                               <p:par>
-                                <p:cTn id="23" presetID="1" presetClass="entr" presetSubtype="0" fill="hold" grpId="0" nodeType="withEffect">
+                                <p:cTn id="23" presetID="1" presetClass="entr" presetSubtype="0" fill="hold" grpId="0" nodeType="clickEffect">
                                   <p:stCondLst>
                                     <p:cond delay="0"/>
                                   </p:stCondLst>
@@ -4925,6 +4952,37 @@
                                           <p:spTgt spid="3">
                                             <p:txEl>
                                               <p:pRg st="6" end="6"/>
+                                            </p:txEl>
+                                          </p:spTgt>
+                                        </p:tgtEl>
+                                        <p:attrNameLst>
+                                          <p:attrName>style.visibility</p:attrName>
+                                        </p:attrNameLst>
+                                      </p:cBhvr>
+                                      <p:to>
+                                        <p:strVal val="visible"/>
+                                      </p:to>
+                                    </p:set>
+                                  </p:childTnLst>
+                                </p:cTn>
+                              </p:par>
+                              <p:par>
+                                <p:cTn id="25" presetID="1" presetClass="entr" presetSubtype="0" fill="hold" grpId="0" nodeType="withEffect">
+                                  <p:stCondLst>
+                                    <p:cond delay="0"/>
+                                  </p:stCondLst>
+                                  <p:childTnLst>
+                                    <p:set>
+                                      <p:cBhvr>
+                                        <p:cTn id="26" dur="1" fill="hold">
+                                          <p:stCondLst>
+                                            <p:cond delay="0"/>
+                                          </p:stCondLst>
+                                        </p:cTn>
+                                        <p:tgtEl>
+                                          <p:spTgt spid="3">
+                                            <p:txEl>
+                                              <p:pRg st="7" end="7"/>
                                             </p:txEl>
                                           </p:spTgt>
                                         </p:tgtEl>
@@ -7706,21 +7764,21 @@
 </file>
 
 <file path=customXml/item2.xml><?xml version="1.0" encoding="utf-8"?>
+<?mso-contentType ?>
+<FormTemplates xmlns="http://schemas.microsoft.com/sharepoint/v3/contenttype/forms">
+  <Display>DocumentLibraryForm</Display>
+  <Edit>DocumentLibraryForm</Edit>
+  <New>DocumentLibraryForm</New>
+</FormTemplates>
+</file>
+
+<file path=customXml/item3.xml><?xml version="1.0" encoding="utf-8"?>
 <p:properties xmlns:p="http://schemas.microsoft.com/office/2006/metadata/properties" xmlns:xsi="http://www.w3.org/2001/XMLSchema-instance" xmlns:pc="http://schemas.microsoft.com/office/infopath/2007/PartnerControls">
   <documentManagement>
     <_ip_UnifiedCompliancePolicyUIAction xmlns="http://schemas.microsoft.com/sharepoint/v3" xsi:nil="true"/>
     <_ip_UnifiedCompliancePolicyProperties xmlns="http://schemas.microsoft.com/sharepoint/v3" xsi:nil="true"/>
   </documentManagement>
 </p:properties>
-</file>
-
-<file path=customXml/item3.xml><?xml version="1.0" encoding="utf-8"?>
-<?mso-contentType ?>
-<FormTemplates xmlns="http://schemas.microsoft.com/sharepoint/v3/contenttype/forms">
-  <Display>DocumentLibraryForm</Display>
-  <Edit>DocumentLibraryForm</Edit>
-  <New>DocumentLibraryForm</New>
-</FormTemplates>
 </file>
 
 <file path=customXml/itemProps1.xml><?xml version="1.0" encoding="utf-8"?>
@@ -7743,6 +7801,14 @@
 </file>
 
 <file path=customXml/itemProps2.xml><?xml version="1.0" encoding="utf-8"?>
+<ds:datastoreItem xmlns:ds="http://schemas.openxmlformats.org/officeDocument/2006/customXml" ds:itemID="{F2B6ED57-6288-4175-9A86-9223DA06A714}">
+  <ds:schemaRefs>
+    <ds:schemaRef ds:uri="http://schemas.microsoft.com/sharepoint/v3/contenttype/forms"/>
+  </ds:schemaRefs>
+</ds:datastoreItem>
+</file>
+
+<file path=customXml/itemProps3.xml><?xml version="1.0" encoding="utf-8"?>
 <ds:datastoreItem xmlns:ds="http://schemas.openxmlformats.org/officeDocument/2006/customXml" ds:itemID="{41F20580-3A3E-4D2A-A253-49F8C68C2C98}">
   <ds:schemaRefs>
     <ds:schemaRef ds:uri="http://schemas.microsoft.com/office/2006/metadata/properties"/>
@@ -7750,12 +7816,4 @@
     <ds:schemaRef ds:uri="http://schemas.microsoft.com/sharepoint/v3"/>
   </ds:schemaRefs>
 </ds:datastoreItem>
-</file>
-
-<file path=customXml/itemProps3.xml><?xml version="1.0" encoding="utf-8"?>
-<ds:datastoreItem xmlns:ds="http://schemas.openxmlformats.org/officeDocument/2006/customXml" ds:itemID="{F2B6ED57-6288-4175-9A86-9223DA06A714}">
-  <ds:schemaRefs>
-    <ds:schemaRef ds:uri="http://schemas.microsoft.com/sharepoint/v3/contenttype/forms"/>
-  </ds:schemaRefs>
-</ds:datastoreItem>
 </file>
</xml_diff>